<commit_message>
layout PPT project edited
</commit_message>
<xml_diff>
--- a/TeamProjectPPT.pptx
+++ b/TeamProjectPPT.pptx
@@ -2,7 +2,7 @@
 <file path=ppt/presentation.xml><?xml version="1.0" encoding="utf-8"?>
 <p:presentation xmlns:a="http://schemas.openxmlformats.org/drawingml/2006/main" xmlns:r="http://schemas.openxmlformats.org/officeDocument/2006/relationships" xmlns:p="http://schemas.openxmlformats.org/presentationml/2006/main" saveSubsetFonts="1">
   <p:sldMasterIdLst>
-    <p:sldMasterId id="2147483648" r:id="rId1"/>
+    <p:sldMasterId id="2147483672" r:id="rId1"/>
   </p:sldMasterIdLst>
   <p:notesMasterIdLst>
     <p:notesMasterId r:id="rId7"/>
@@ -201,7 +201,7 @@
           <a:p>
             <a:fld id="{A1E86964-1A4A-44B0-87A4-8041E4AE12E0}" type="datetimeFigureOut">
               <a:rPr lang="ko-KR" altLang="en-US" smtClean="0"/>
-              <a:t>2016-09-12</a:t>
+              <a:t>2016-09-13</a:t>
             </a:fld>
             <a:endParaRPr lang="ko-KR" altLang="en-US"/>
           </a:p>
@@ -582,7 +582,7 @@
 </file>
 
 <file path=ppt/slideLayouts/slideLayout1.xml><?xml version="1.0" encoding="utf-8"?>
-<p:sldLayout xmlns:a="http://schemas.openxmlformats.org/drawingml/2006/main" xmlns:r="http://schemas.openxmlformats.org/officeDocument/2006/relationships" xmlns:p="http://schemas.openxmlformats.org/presentationml/2006/main" type="title" preserve="1">
+<p:sldLayout xmlns:a="http://schemas.openxmlformats.org/drawingml/2006/main" xmlns:r="http://schemas.openxmlformats.org/officeDocument/2006/relationships" xmlns:p="http://schemas.openxmlformats.org/presentationml/2006/main" showMasterSp="0" type="title" preserve="1">
   <p:cSld name="Title Slide">
     <p:spTree>
       <p:nvGrpSpPr>
@@ -600,25 +600,109 @@
       </p:grpSpPr>
       <p:sp>
         <p:nvSpPr>
-          <p:cNvPr id="2" name="Title 1"/>
-          <p:cNvSpPr>
-            <a:spLocks noGrp="1"/>
-          </p:cNvSpPr>
-          <p:nvPr>
-            <p:ph type="ctrTitle"/>
-          </p:nvPr>
+          <p:cNvPr id="7" name="Rectangle 6"/>
+          <p:cNvSpPr/>
+          <p:nvPr/>
         </p:nvSpPr>
         <p:spPr>
           <a:xfrm>
-            <a:off x="1524000" y="1122363"/>
-            <a:ext cx="9144000" cy="2387600"/>
+            <a:off x="0" y="761999"/>
+            <a:ext cx="9141619" cy="5334001"/>
+          </a:xfrm>
+          <a:prstGeom prst="rect">
+            <a:avLst/>
+          </a:prstGeom>
+          <a:solidFill>
+            <a:schemeClr val="accent1"/>
+          </a:solidFill>
+          <a:ln>
+            <a:noFill/>
+          </a:ln>
+        </p:spPr>
+        <p:style>
+          <a:lnRef idx="2">
+            <a:schemeClr val="accent1">
+              <a:shade val="50000"/>
+            </a:schemeClr>
+          </a:lnRef>
+          <a:fillRef idx="1">
+            <a:schemeClr val="accent1"/>
+          </a:fillRef>
+          <a:effectRef idx="0">
+            <a:schemeClr val="accent1"/>
+          </a:effectRef>
+          <a:fontRef idx="minor">
+            <a:schemeClr val="lt1"/>
+          </a:fontRef>
+        </p:style>
+      </p:sp>
+      <p:sp>
+        <p:nvSpPr>
+          <p:cNvPr id="8" name="Rectangle 7"/>
+          <p:cNvSpPr/>
+          <p:nvPr/>
+        </p:nvSpPr>
+        <p:spPr>
+          <a:xfrm>
+            <a:off x="9270263" y="761999"/>
+            <a:ext cx="2925318" cy="5334001"/>
+          </a:xfrm>
+          <a:prstGeom prst="rect">
+            <a:avLst/>
+          </a:prstGeom>
+          <a:solidFill>
+            <a:srgbClr val="C8C8C8">
+              <a:alpha val="50000"/>
+            </a:srgbClr>
+          </a:solidFill>
+          <a:ln>
+            <a:noFill/>
+          </a:ln>
+        </p:spPr>
+        <p:style>
+          <a:lnRef idx="2">
+            <a:schemeClr val="accent1">
+              <a:shade val="50000"/>
+            </a:schemeClr>
+          </a:lnRef>
+          <a:fillRef idx="1">
+            <a:schemeClr val="accent1"/>
+          </a:fillRef>
+          <a:effectRef idx="0">
+            <a:schemeClr val="accent1"/>
+          </a:effectRef>
+          <a:fontRef idx="minor">
+            <a:schemeClr val="lt1"/>
+          </a:fontRef>
+        </p:style>
+      </p:sp>
+      <p:sp>
+        <p:nvSpPr>
+          <p:cNvPr id="2" name="Title 1"/>
+          <p:cNvSpPr>
+            <a:spLocks noGrp="1"/>
+          </p:cNvSpPr>
+          <p:nvPr>
+            <p:ph type="ctrTitle"/>
+          </p:nvPr>
+        </p:nvSpPr>
+        <p:spPr>
+          <a:xfrm>
+            <a:off x="1069848" y="1298448"/>
+            <a:ext cx="7315200" cy="3255264"/>
           </a:xfrm>
         </p:spPr>
         <p:txBody>
-          <a:bodyPr anchor="b"/>
+          <a:bodyPr anchor="b">
+            <a:normAutofit/>
+          </a:bodyPr>
           <a:lstStyle>
-            <a:lvl1pPr algn="ctr">
-              <a:defRPr sz="6000"/>
+            <a:lvl1pPr algn="l">
+              <a:defRPr sz="5900" spc="-100" baseline="0">
+                <a:solidFill>
+                  <a:srgbClr val="FFFFFF"/>
+                </a:solidFill>
+              </a:defRPr>
             </a:lvl1pPr>
           </a:lstStyle>
           <a:p>
@@ -626,7 +710,7 @@
               <a:rPr lang="en-US" altLang="ko-KR" smtClean="0"/>
               <a:t>Click to edit Master title style</a:t>
             </a:r>
-            <a:endParaRPr lang="ko-KR" altLang="en-US"/>
+            <a:endParaRPr lang="en-US" dirty="0"/>
           </a:p>
         </p:txBody>
       </p:sp>
@@ -642,48 +726,57 @@
         </p:nvSpPr>
         <p:spPr>
           <a:xfrm>
-            <a:off x="1524000" y="3602038"/>
-            <a:ext cx="9144000" cy="1655762"/>
+            <a:off x="1100015" y="4670246"/>
+            <a:ext cx="7315200" cy="914400"/>
           </a:xfrm>
         </p:spPr>
         <p:txBody>
-          <a:bodyPr/>
+          <a:bodyPr anchor="t">
+            <a:normAutofit/>
+          </a:bodyPr>
           <a:lstStyle>
-            <a:lvl1pPr marL="0" indent="0" algn="ctr">
-              <a:buNone/>
-              <a:defRPr sz="2400"/>
+            <a:lvl1pPr marL="0" indent="0" algn="l">
+              <a:buNone/>
+              <a:defRPr sz="2200" cap="none" spc="0" baseline="0">
+                <a:solidFill>
+                  <a:schemeClr val="accent1">
+                    <a:lumMod val="20000"/>
+                    <a:lumOff val="80000"/>
+                  </a:schemeClr>
+                </a:solidFill>
+              </a:defRPr>
             </a:lvl1pPr>
             <a:lvl2pPr marL="457200" indent="0" algn="ctr">
               <a:buNone/>
-              <a:defRPr sz="2000"/>
+              <a:defRPr sz="2200"/>
             </a:lvl2pPr>
             <a:lvl3pPr marL="914400" indent="0" algn="ctr">
               <a:buNone/>
-              <a:defRPr sz="1800"/>
+              <a:defRPr sz="2200"/>
             </a:lvl3pPr>
             <a:lvl4pPr marL="1371600" indent="0" algn="ctr">
               <a:buNone/>
-              <a:defRPr sz="1600"/>
+              <a:defRPr sz="2000"/>
             </a:lvl4pPr>
             <a:lvl5pPr marL="1828800" indent="0" algn="ctr">
               <a:buNone/>
-              <a:defRPr sz="1600"/>
+              <a:defRPr sz="2000"/>
             </a:lvl5pPr>
             <a:lvl6pPr marL="2286000" indent="0" algn="ctr">
               <a:buNone/>
-              <a:defRPr sz="1600"/>
+              <a:defRPr sz="2000"/>
             </a:lvl6pPr>
             <a:lvl7pPr marL="2743200" indent="0" algn="ctr">
               <a:buNone/>
-              <a:defRPr sz="1600"/>
+              <a:defRPr sz="2000"/>
             </a:lvl7pPr>
             <a:lvl8pPr marL="3200400" indent="0" algn="ctr">
               <a:buNone/>
-              <a:defRPr sz="1600"/>
+              <a:defRPr sz="2000"/>
             </a:lvl8pPr>
             <a:lvl9pPr marL="3657600" indent="0" algn="ctr">
               <a:buNone/>
-              <a:defRPr sz="1600"/>
+              <a:defRPr sz="2000"/>
             </a:lvl9pPr>
           </a:lstStyle>
           <a:p>
@@ -691,7 +784,7 @@
               <a:rPr lang="en-US" altLang="ko-KR" smtClean="0"/>
               <a:t>Click to edit Master subtitle style</a:t>
             </a:r>
-            <a:endParaRPr lang="ko-KR" altLang="en-US"/>
+            <a:endParaRPr lang="en-US" dirty="0"/>
           </a:p>
         </p:txBody>
       </p:sp>
@@ -712,7 +805,7 @@
           <a:p>
             <a:fld id="{3850A63D-0EEB-44F7-9147-334421329CD8}" type="datetimeFigureOut">
               <a:rPr lang="ko-KR" altLang="en-US" smtClean="0"/>
-              <a:t>2016-09-12</a:t>
+              <a:t>2016-09-13</a:t>
             </a:fld>
             <a:endParaRPr lang="ko-KR" altLang="en-US"/>
           </a:p>
@@ -763,7 +856,7 @@
     </p:spTree>
     <p:extLst>
       <p:ext uri="{BB962C8B-B14F-4D97-AF65-F5344CB8AC3E}">
-        <p14:creationId xmlns:p14="http://schemas.microsoft.com/office/powerpoint/2010/main" val="1787447495"/>
+        <p14:creationId xmlns:p14="http://schemas.microsoft.com/office/powerpoint/2010/main" val="1843765747"/>
       </p:ext>
     </p:extLst>
   </p:cSld>
@@ -809,7 +902,7 @@
               <a:rPr lang="en-US" altLang="ko-KR" smtClean="0"/>
               <a:t>Click to edit Master title style</a:t>
             </a:r>
-            <a:endParaRPr lang="ko-KR" altLang="en-US"/>
+            <a:endParaRPr lang="en-US" dirty="0"/>
           </a:p>
         </p:txBody>
       </p:sp>
@@ -825,7 +918,7 @@
         </p:nvSpPr>
         <p:spPr/>
         <p:txBody>
-          <a:bodyPr vert="eaVert"/>
+          <a:bodyPr vert="eaVert" anchor="t"/>
           <a:lstStyle/>
           <a:p>
             <a:pPr lvl="0"/>
@@ -861,13 +954,13 @@
               <a:rPr lang="en-US" altLang="ko-KR" smtClean="0"/>
               <a:t>Fifth level</a:t>
             </a:r>
-            <a:endParaRPr lang="ko-KR" altLang="en-US"/>
-          </a:p>
-        </p:txBody>
-      </p:sp>
-      <p:sp>
-        <p:nvSpPr>
-          <p:cNvPr id="4" name="Date Placeholder 3"/>
+            <a:endParaRPr lang="en-US" dirty="0"/>
+          </a:p>
+        </p:txBody>
+      </p:sp>
+      <p:sp>
+        <p:nvSpPr>
+          <p:cNvPr id="7" name="Date Placeholder 6"/>
           <p:cNvSpPr>
             <a:spLocks noGrp="1"/>
           </p:cNvSpPr>
@@ -882,7 +975,7 @@
           <a:p>
             <a:fld id="{3850A63D-0EEB-44F7-9147-334421329CD8}" type="datetimeFigureOut">
               <a:rPr lang="ko-KR" altLang="en-US" smtClean="0"/>
-              <a:t>2016-09-12</a:t>
+              <a:t>2016-09-13</a:t>
             </a:fld>
             <a:endParaRPr lang="ko-KR" altLang="en-US"/>
           </a:p>
@@ -890,7 +983,7 @@
       </p:sp>
       <p:sp>
         <p:nvSpPr>
-          <p:cNvPr id="5" name="Footer Placeholder 4"/>
+          <p:cNvPr id="8" name="Footer Placeholder 7"/>
           <p:cNvSpPr>
             <a:spLocks noGrp="1"/>
           </p:cNvSpPr>
@@ -909,7 +1002,7 @@
       </p:sp>
       <p:sp>
         <p:nvSpPr>
-          <p:cNvPr id="6" name="Slide Number Placeholder 5"/>
+          <p:cNvPr id="9" name="Slide Number Placeholder 8"/>
           <p:cNvSpPr>
             <a:spLocks noGrp="1"/>
           </p:cNvSpPr>
@@ -933,7 +1026,7 @@
     </p:spTree>
     <p:extLst>
       <p:ext uri="{BB962C8B-B14F-4D97-AF65-F5344CB8AC3E}">
-        <p14:creationId xmlns:p14="http://schemas.microsoft.com/office/powerpoint/2010/main" val="3848285413"/>
+        <p14:creationId xmlns:p14="http://schemas.microsoft.com/office/powerpoint/2010/main" val="2912961030"/>
       </p:ext>
     </p:extLst>
   </p:cSld>
@@ -972,8 +1065,8 @@
         </p:nvSpPr>
         <p:spPr>
           <a:xfrm>
-            <a:off x="8724900" y="365125"/>
-            <a:ext cx="2628900" cy="5811838"/>
+            <a:off x="381000" y="990600"/>
+            <a:ext cx="2819400" cy="4953000"/>
           </a:xfrm>
         </p:spPr>
         <p:txBody>
@@ -984,7 +1077,7 @@
               <a:rPr lang="en-US" altLang="ko-KR" smtClean="0"/>
               <a:t>Click to edit Master title style</a:t>
             </a:r>
-            <a:endParaRPr lang="ko-KR" altLang="en-US"/>
+            <a:endParaRPr lang="en-US" dirty="0"/>
           </a:p>
         </p:txBody>
       </p:sp>
@@ -1000,12 +1093,12 @@
         </p:nvSpPr>
         <p:spPr>
           <a:xfrm>
-            <a:off x="838200" y="365125"/>
-            <a:ext cx="7734300" cy="5811838"/>
+            <a:off x="3867912" y="868680"/>
+            <a:ext cx="7315200" cy="5120640"/>
           </a:xfrm>
         </p:spPr>
         <p:txBody>
-          <a:bodyPr vert="eaVert"/>
+          <a:bodyPr vert="eaVert" anchor="t"/>
           <a:lstStyle/>
           <a:p>
             <a:pPr lvl="0"/>
@@ -1041,13 +1134,13 @@
               <a:rPr lang="en-US" altLang="ko-KR" smtClean="0"/>
               <a:t>Fifth level</a:t>
             </a:r>
-            <a:endParaRPr lang="ko-KR" altLang="en-US"/>
-          </a:p>
-        </p:txBody>
-      </p:sp>
-      <p:sp>
-        <p:nvSpPr>
-          <p:cNvPr id="4" name="Date Placeholder 3"/>
+            <a:endParaRPr lang="en-US" dirty="0"/>
+          </a:p>
+        </p:txBody>
+      </p:sp>
+      <p:sp>
+        <p:nvSpPr>
+          <p:cNvPr id="7" name="Date Placeholder 6"/>
           <p:cNvSpPr>
             <a:spLocks noGrp="1"/>
           </p:cNvSpPr>
@@ -1062,7 +1155,7 @@
           <a:p>
             <a:fld id="{3850A63D-0EEB-44F7-9147-334421329CD8}" type="datetimeFigureOut">
               <a:rPr lang="ko-KR" altLang="en-US" smtClean="0"/>
-              <a:t>2016-09-12</a:t>
+              <a:t>2016-09-13</a:t>
             </a:fld>
             <a:endParaRPr lang="ko-KR" altLang="en-US"/>
           </a:p>
@@ -1070,7 +1163,7 @@
       </p:sp>
       <p:sp>
         <p:nvSpPr>
-          <p:cNvPr id="5" name="Footer Placeholder 4"/>
+          <p:cNvPr id="8" name="Footer Placeholder 7"/>
           <p:cNvSpPr>
             <a:spLocks noGrp="1"/>
           </p:cNvSpPr>
@@ -1089,7 +1182,7 @@
       </p:sp>
       <p:sp>
         <p:nvSpPr>
-          <p:cNvPr id="6" name="Slide Number Placeholder 5"/>
+          <p:cNvPr id="9" name="Slide Number Placeholder 8"/>
           <p:cNvSpPr>
             <a:spLocks noGrp="1"/>
           </p:cNvSpPr>
@@ -1113,7 +1206,7 @@
     </p:spTree>
     <p:extLst>
       <p:ext uri="{BB962C8B-B14F-4D97-AF65-F5344CB8AC3E}">
-        <p14:creationId xmlns:p14="http://schemas.microsoft.com/office/powerpoint/2010/main" val="3829340072"/>
+        <p14:creationId xmlns:p14="http://schemas.microsoft.com/office/powerpoint/2010/main" val="3156004143"/>
       </p:ext>
     </p:extLst>
   </p:cSld>
@@ -1159,7 +1252,7 @@
               <a:rPr lang="en-US" altLang="ko-KR" smtClean="0"/>
               <a:t>Click to edit Master title style</a:t>
             </a:r>
-            <a:endParaRPr lang="ko-KR" altLang="en-US"/>
+            <a:endParaRPr lang="en-US" dirty="0"/>
           </a:p>
         </p:txBody>
       </p:sp>
@@ -1211,7 +1304,7 @@
               <a:rPr lang="en-US" altLang="ko-KR" smtClean="0"/>
               <a:t>Fifth level</a:t>
             </a:r>
-            <a:endParaRPr lang="ko-KR" altLang="en-US"/>
+            <a:endParaRPr lang="en-US" dirty="0"/>
           </a:p>
         </p:txBody>
       </p:sp>
@@ -1232,7 +1325,7 @@
           <a:p>
             <a:fld id="{3850A63D-0EEB-44F7-9147-334421329CD8}" type="datetimeFigureOut">
               <a:rPr lang="ko-KR" altLang="en-US" smtClean="0"/>
-              <a:t>2016-09-12</a:t>
+              <a:t>2016-09-13</a:t>
             </a:fld>
             <a:endParaRPr lang="ko-KR" altLang="en-US"/>
           </a:p>
@@ -1283,7 +1376,7 @@
     </p:spTree>
     <p:extLst>
       <p:ext uri="{BB962C8B-B14F-4D97-AF65-F5344CB8AC3E}">
-        <p14:creationId xmlns:p14="http://schemas.microsoft.com/office/powerpoint/2010/main" val="2401021061"/>
+        <p14:creationId xmlns:p14="http://schemas.microsoft.com/office/powerpoint/2010/main" val="2885455219"/>
       </p:ext>
     </p:extLst>
   </p:cSld>
@@ -1322,58 +1415,66 @@
         </p:nvSpPr>
         <p:spPr>
           <a:xfrm>
-            <a:off x="831850" y="1709738"/>
-            <a:ext cx="10515600" cy="2852737"/>
+            <a:off x="3867912" y="1298448"/>
+            <a:ext cx="7315200" cy="3255264"/>
           </a:xfrm>
         </p:spPr>
         <p:txBody>
-          <a:bodyPr anchor="b"/>
+          <a:bodyPr anchor="b">
+            <a:normAutofit/>
+          </a:bodyPr>
           <a:lstStyle>
             <a:lvl1pPr>
-              <a:defRPr sz="6000"/>
-            </a:lvl1pPr>
-          </a:lstStyle>
-          <a:p>
-            <a:r>
-              <a:rPr lang="en-US" altLang="ko-KR" smtClean="0"/>
-              <a:t>Click to edit Master title style</a:t>
-            </a:r>
-            <a:endParaRPr lang="ko-KR" altLang="en-US"/>
-          </a:p>
-        </p:txBody>
-      </p:sp>
-      <p:sp>
-        <p:nvSpPr>
-          <p:cNvPr id="3" name="Text Placeholder 2"/>
-          <p:cNvSpPr>
-            <a:spLocks noGrp="1"/>
-          </p:cNvSpPr>
-          <p:nvPr>
-            <p:ph type="body" idx="1"/>
-          </p:nvPr>
-        </p:nvSpPr>
-        <p:spPr>
-          <a:xfrm>
-            <a:off x="831850" y="4589463"/>
-            <a:ext cx="10515600" cy="1500187"/>
-          </a:xfrm>
-        </p:spPr>
-        <p:txBody>
-          <a:bodyPr/>
-          <a:lstStyle>
-            <a:lvl1pPr marL="0" indent="0">
-              <a:buNone/>
-              <a:defRPr sz="2400">
+              <a:defRPr sz="5900" b="0" spc="-100" baseline="0">
                 <a:solidFill>
-                  <a:schemeClr val="tx1">
-                    <a:tint val="75000"/>
+                  <a:schemeClr val="tx2">
+                    <a:lumMod val="75000"/>
                   </a:schemeClr>
                 </a:solidFill>
               </a:defRPr>
             </a:lvl1pPr>
+          </a:lstStyle>
+          <a:p>
+            <a:r>
+              <a:rPr lang="en-US" altLang="ko-KR" smtClean="0"/>
+              <a:t>Click to edit Master title style</a:t>
+            </a:r>
+            <a:endParaRPr lang="en-US" dirty="0"/>
+          </a:p>
+        </p:txBody>
+      </p:sp>
+      <p:sp>
+        <p:nvSpPr>
+          <p:cNvPr id="3" name="Text Placeholder 2"/>
+          <p:cNvSpPr>
+            <a:spLocks noGrp="1"/>
+          </p:cNvSpPr>
+          <p:nvPr>
+            <p:ph type="body" idx="1"/>
+          </p:nvPr>
+        </p:nvSpPr>
+        <p:spPr>
+          <a:xfrm>
+            <a:off x="3886200" y="4672584"/>
+            <a:ext cx="7315200" cy="914400"/>
+          </a:xfrm>
+        </p:spPr>
+        <p:txBody>
+          <a:bodyPr anchor="t">
+            <a:normAutofit/>
+          </a:bodyPr>
+          <a:lstStyle>
+            <a:lvl1pPr marL="0" indent="0">
+              <a:buNone/>
+              <a:defRPr sz="2200" cap="none" spc="0" baseline="0">
+                <a:solidFill>
+                  <a:schemeClr val="tx2"/>
+                </a:solidFill>
+              </a:defRPr>
+            </a:lvl1pPr>
             <a:lvl2pPr marL="457200" indent="0">
               <a:buNone/>
-              <a:defRPr sz="2000">
+              <a:defRPr sz="1800">
                 <a:solidFill>
                   <a:schemeClr val="tx1">
                     <a:tint val="75000"/>
@@ -1383,7 +1484,7 @@
             </a:lvl2pPr>
             <a:lvl3pPr marL="914400" indent="0">
               <a:buNone/>
-              <a:defRPr sz="1800">
+              <a:defRPr sz="1600">
                 <a:solidFill>
                   <a:schemeClr val="tx1">
                     <a:tint val="75000"/>
@@ -1393,7 +1494,7 @@
             </a:lvl3pPr>
             <a:lvl4pPr marL="1371600" indent="0">
               <a:buNone/>
-              <a:defRPr sz="1600">
+              <a:defRPr sz="1400">
                 <a:solidFill>
                   <a:schemeClr val="tx1">
                     <a:tint val="75000"/>
@@ -1403,7 +1504,7 @@
             </a:lvl4pPr>
             <a:lvl5pPr marL="1828800" indent="0">
               <a:buNone/>
-              <a:defRPr sz="1600">
+              <a:defRPr sz="1400">
                 <a:solidFill>
                   <a:schemeClr val="tx1">
                     <a:tint val="75000"/>
@@ -1413,7 +1514,7 @@
             </a:lvl5pPr>
             <a:lvl6pPr marL="2286000" indent="0">
               <a:buNone/>
-              <a:defRPr sz="1600">
+              <a:defRPr sz="1400">
                 <a:solidFill>
                   <a:schemeClr val="tx1">
                     <a:tint val="75000"/>
@@ -1423,7 +1524,7 @@
             </a:lvl6pPr>
             <a:lvl7pPr marL="2743200" indent="0">
               <a:buNone/>
-              <a:defRPr sz="1600">
+              <a:defRPr sz="1400">
                 <a:solidFill>
                   <a:schemeClr val="tx1">
                     <a:tint val="75000"/>
@@ -1433,7 +1534,7 @@
             </a:lvl7pPr>
             <a:lvl8pPr marL="3200400" indent="0">
               <a:buNone/>
-              <a:defRPr sz="1600">
+              <a:defRPr sz="1400">
                 <a:solidFill>
                   <a:schemeClr val="tx1">
                     <a:tint val="75000"/>
@@ -1443,7 +1544,7 @@
             </a:lvl8pPr>
             <a:lvl9pPr marL="3657600" indent="0">
               <a:buNone/>
-              <a:defRPr sz="1600">
+              <a:defRPr sz="1400">
                 <a:solidFill>
                   <a:schemeClr val="tx1">
                     <a:tint val="75000"/>
@@ -1478,7 +1579,7 @@
           <a:p>
             <a:fld id="{3850A63D-0EEB-44F7-9147-334421329CD8}" type="datetimeFigureOut">
               <a:rPr lang="ko-KR" altLang="en-US" smtClean="0"/>
-              <a:t>2016-09-12</a:t>
+              <a:t>2016-09-13</a:t>
             </a:fld>
             <a:endParaRPr lang="ko-KR" altLang="en-US"/>
           </a:p>
@@ -1529,7 +1630,7 @@
     </p:spTree>
     <p:extLst>
       <p:ext uri="{BB962C8B-B14F-4D97-AF65-F5344CB8AC3E}">
-        <p14:creationId xmlns:p14="http://schemas.microsoft.com/office/powerpoint/2010/main" val="1479769835"/>
+        <p14:creationId xmlns:p14="http://schemas.microsoft.com/office/powerpoint/2010/main" val="2644081766"/>
       </p:ext>
     </p:extLst>
   </p:cSld>
@@ -1575,7 +1676,7 @@
               <a:rPr lang="en-US" altLang="ko-KR" smtClean="0"/>
               <a:t>Click to edit Master title style</a:t>
             </a:r>
-            <a:endParaRPr lang="ko-KR" altLang="en-US"/>
+            <a:endParaRPr lang="en-US" dirty="0"/>
           </a:p>
         </p:txBody>
       </p:sp>
@@ -1591,13 +1692,41 @@
         </p:nvSpPr>
         <p:spPr>
           <a:xfrm>
-            <a:off x="838200" y="1825625"/>
-            <a:ext cx="5181600" cy="4351338"/>
+            <a:off x="3867912" y="868680"/>
+            <a:ext cx="3474720" cy="5120640"/>
           </a:xfrm>
         </p:spPr>
         <p:txBody>
           <a:bodyPr/>
-          <a:lstStyle/>
+          <a:lstStyle>
+            <a:lvl1pPr>
+              <a:defRPr sz="2000"/>
+            </a:lvl1pPr>
+            <a:lvl2pPr>
+              <a:defRPr sz="1800"/>
+            </a:lvl2pPr>
+            <a:lvl3pPr>
+              <a:defRPr sz="1600"/>
+            </a:lvl3pPr>
+            <a:lvl4pPr>
+              <a:defRPr sz="1400"/>
+            </a:lvl4pPr>
+            <a:lvl5pPr>
+              <a:defRPr sz="1400"/>
+            </a:lvl5pPr>
+            <a:lvl6pPr>
+              <a:defRPr sz="1400"/>
+            </a:lvl6pPr>
+            <a:lvl7pPr>
+              <a:defRPr sz="1400"/>
+            </a:lvl7pPr>
+            <a:lvl8pPr>
+              <a:defRPr sz="1400"/>
+            </a:lvl8pPr>
+            <a:lvl9pPr>
+              <a:defRPr sz="1400"/>
+            </a:lvl9pPr>
+          </a:lstStyle>
           <a:p>
             <a:pPr lvl="0"/>
             <a:r>
@@ -1632,7 +1761,7 @@
               <a:rPr lang="en-US" altLang="ko-KR" smtClean="0"/>
               <a:t>Fifth level</a:t>
             </a:r>
-            <a:endParaRPr lang="ko-KR" altLang="en-US"/>
+            <a:endParaRPr lang="en-US" dirty="0"/>
           </a:p>
         </p:txBody>
       </p:sp>
@@ -1648,13 +1777,41 @@
         </p:nvSpPr>
         <p:spPr>
           <a:xfrm>
-            <a:off x="6172200" y="1825625"/>
-            <a:ext cx="5181600" cy="4351338"/>
+            <a:off x="7818120" y="868680"/>
+            <a:ext cx="3474720" cy="5120640"/>
           </a:xfrm>
         </p:spPr>
         <p:txBody>
           <a:bodyPr/>
-          <a:lstStyle/>
+          <a:lstStyle>
+            <a:lvl1pPr>
+              <a:defRPr sz="2000"/>
+            </a:lvl1pPr>
+            <a:lvl2pPr>
+              <a:defRPr sz="1800"/>
+            </a:lvl2pPr>
+            <a:lvl3pPr>
+              <a:defRPr sz="1600"/>
+            </a:lvl3pPr>
+            <a:lvl4pPr>
+              <a:defRPr sz="1400"/>
+            </a:lvl4pPr>
+            <a:lvl5pPr>
+              <a:defRPr sz="1400"/>
+            </a:lvl5pPr>
+            <a:lvl6pPr>
+              <a:defRPr sz="1400"/>
+            </a:lvl6pPr>
+            <a:lvl7pPr>
+              <a:defRPr sz="1400"/>
+            </a:lvl7pPr>
+            <a:lvl8pPr>
+              <a:defRPr sz="1400"/>
+            </a:lvl8pPr>
+            <a:lvl9pPr>
+              <a:defRPr sz="1400"/>
+            </a:lvl9pPr>
+          </a:lstStyle>
           <a:p>
             <a:pPr lvl="0"/>
             <a:r>
@@ -1689,13 +1846,13 @@
               <a:rPr lang="en-US" altLang="ko-KR" smtClean="0"/>
               <a:t>Fifth level</a:t>
             </a:r>
-            <a:endParaRPr lang="ko-KR" altLang="en-US"/>
-          </a:p>
-        </p:txBody>
-      </p:sp>
-      <p:sp>
-        <p:nvSpPr>
-          <p:cNvPr id="5" name="Date Placeholder 4"/>
+            <a:endParaRPr lang="en-US" dirty="0"/>
+          </a:p>
+        </p:txBody>
+      </p:sp>
+      <p:sp>
+        <p:nvSpPr>
+          <p:cNvPr id="8" name="Date Placeholder 7"/>
           <p:cNvSpPr>
             <a:spLocks noGrp="1"/>
           </p:cNvSpPr>
@@ -1710,7 +1867,7 @@
           <a:p>
             <a:fld id="{3850A63D-0EEB-44F7-9147-334421329CD8}" type="datetimeFigureOut">
               <a:rPr lang="ko-KR" altLang="en-US" smtClean="0"/>
-              <a:t>2016-09-12</a:t>
+              <a:t>2016-09-13</a:t>
             </a:fld>
             <a:endParaRPr lang="ko-KR" altLang="en-US"/>
           </a:p>
@@ -1718,7 +1875,7 @@
       </p:sp>
       <p:sp>
         <p:nvSpPr>
-          <p:cNvPr id="6" name="Footer Placeholder 5"/>
+          <p:cNvPr id="9" name="Footer Placeholder 8"/>
           <p:cNvSpPr>
             <a:spLocks noGrp="1"/>
           </p:cNvSpPr>
@@ -1737,7 +1894,7 @@
       </p:sp>
       <p:sp>
         <p:nvSpPr>
-          <p:cNvPr id="7" name="Slide Number Placeholder 6"/>
+          <p:cNvPr id="10" name="Slide Number Placeholder 9"/>
           <p:cNvSpPr>
             <a:spLocks noGrp="1"/>
           </p:cNvSpPr>
@@ -1761,7 +1918,7 @@
     </p:spTree>
     <p:extLst>
       <p:ext uri="{BB962C8B-B14F-4D97-AF65-F5344CB8AC3E}">
-        <p14:creationId xmlns:p14="http://schemas.microsoft.com/office/powerpoint/2010/main" val="2575027124"/>
+        <p14:creationId xmlns:p14="http://schemas.microsoft.com/office/powerpoint/2010/main" val="2249657263"/>
       </p:ext>
     </p:extLst>
   </p:cSld>
@@ -1790,54 +1947,61 @@
       </p:grpSpPr>
       <p:sp>
         <p:nvSpPr>
-          <p:cNvPr id="2" name="Title 1"/>
+          <p:cNvPr id="10" name="Title 9"/>
           <p:cNvSpPr>
             <a:spLocks noGrp="1"/>
           </p:cNvSpPr>
           <p:nvPr>
             <p:ph type="title"/>
+          </p:nvPr>
+        </p:nvSpPr>
+        <p:spPr/>
+        <p:txBody>
+          <a:bodyPr/>
+          <a:lstStyle/>
+          <a:p>
+            <a:r>
+              <a:rPr lang="en-US" altLang="ko-KR" smtClean="0"/>
+              <a:t>Click to edit Master title style</a:t>
+            </a:r>
+            <a:endParaRPr lang="en-US" dirty="0"/>
+          </a:p>
+        </p:txBody>
+      </p:sp>
+      <p:sp>
+        <p:nvSpPr>
+          <p:cNvPr id="3" name="Text Placeholder 2"/>
+          <p:cNvSpPr>
+            <a:spLocks noGrp="1"/>
+          </p:cNvSpPr>
+          <p:nvPr>
+            <p:ph type="body" idx="1"/>
           </p:nvPr>
         </p:nvSpPr>
         <p:spPr>
           <a:xfrm>
-            <a:off x="839788" y="365125"/>
-            <a:ext cx="10515600" cy="1325563"/>
+            <a:off x="3867912" y="1023586"/>
+            <a:ext cx="3474720" cy="807720"/>
           </a:xfrm>
         </p:spPr>
         <p:txBody>
-          <a:bodyPr/>
-          <a:lstStyle/>
-          <a:p>
-            <a:r>
-              <a:rPr lang="en-US" altLang="ko-KR" smtClean="0"/>
-              <a:t>Click to edit Master title style</a:t>
-            </a:r>
-            <a:endParaRPr lang="ko-KR" altLang="en-US"/>
-          </a:p>
-        </p:txBody>
-      </p:sp>
-      <p:sp>
-        <p:nvSpPr>
-          <p:cNvPr id="3" name="Text Placeholder 2"/>
-          <p:cNvSpPr>
-            <a:spLocks noGrp="1"/>
-          </p:cNvSpPr>
-          <p:nvPr>
-            <p:ph type="body" idx="1"/>
-          </p:nvPr>
-        </p:nvSpPr>
-        <p:spPr>
-          <a:xfrm>
-            <a:off x="839788" y="1681163"/>
-            <a:ext cx="5157787" cy="823912"/>
-          </a:xfrm>
-        </p:spPr>
-        <p:txBody>
-          <a:bodyPr anchor="b"/>
+          <a:bodyPr anchor="b">
+            <a:normAutofit/>
+          </a:bodyPr>
           <a:lstStyle>
             <a:lvl1pPr marL="0" indent="0">
-              <a:buNone/>
-              <a:defRPr sz="2400" b="1"/>
+              <a:spcBef>
+                <a:spcPts val="0"/>
+              </a:spcBef>
+              <a:buNone/>
+              <a:defRPr sz="2000" b="1">
+                <a:solidFill>
+                  <a:schemeClr val="tx1">
+                    <a:lumMod val="65000"/>
+                    <a:lumOff val="35000"/>
+                  </a:schemeClr>
+                </a:solidFill>
+              </a:defRPr>
             </a:lvl1pPr>
             <a:lvl2pPr marL="457200" indent="0">
               <a:buNone/>
@@ -1893,13 +2057,41 @@
         </p:nvSpPr>
         <p:spPr>
           <a:xfrm>
-            <a:off x="839788" y="2505075"/>
-            <a:ext cx="5157787" cy="3684588"/>
+            <a:off x="3867912" y="1930936"/>
+            <a:ext cx="3474720" cy="4023360"/>
           </a:xfrm>
         </p:spPr>
         <p:txBody>
           <a:bodyPr/>
-          <a:lstStyle/>
+          <a:lstStyle>
+            <a:lvl1pPr>
+              <a:defRPr sz="2000"/>
+            </a:lvl1pPr>
+            <a:lvl2pPr>
+              <a:defRPr sz="1800"/>
+            </a:lvl2pPr>
+            <a:lvl3pPr>
+              <a:defRPr sz="1600"/>
+            </a:lvl3pPr>
+            <a:lvl4pPr>
+              <a:defRPr sz="1400"/>
+            </a:lvl4pPr>
+            <a:lvl5pPr>
+              <a:defRPr sz="1400"/>
+            </a:lvl5pPr>
+            <a:lvl6pPr>
+              <a:defRPr sz="1400"/>
+            </a:lvl6pPr>
+            <a:lvl7pPr>
+              <a:defRPr sz="1400"/>
+            </a:lvl7pPr>
+            <a:lvl8pPr>
+              <a:defRPr sz="1400"/>
+            </a:lvl8pPr>
+            <a:lvl9pPr>
+              <a:defRPr sz="1400"/>
+            </a:lvl9pPr>
+          </a:lstStyle>
           <a:p>
             <a:pPr lvl="0"/>
             <a:r>
@@ -1934,7 +2126,7 @@
               <a:rPr lang="en-US" altLang="ko-KR" smtClean="0"/>
               <a:t>Fifth level</a:t>
             </a:r>
-            <a:endParaRPr lang="ko-KR" altLang="en-US"/>
+            <a:endParaRPr lang="en-US" dirty="0"/>
           </a:p>
         </p:txBody>
       </p:sp>
@@ -1950,16 +2142,28 @@
         </p:nvSpPr>
         <p:spPr>
           <a:xfrm>
-            <a:off x="6172200" y="1681163"/>
-            <a:ext cx="5183188" cy="823912"/>
+            <a:off x="7818463" y="1023586"/>
+            <a:ext cx="3474720" cy="813171"/>
           </a:xfrm>
         </p:spPr>
         <p:txBody>
-          <a:bodyPr anchor="b"/>
+          <a:bodyPr anchor="b">
+            <a:normAutofit/>
+          </a:bodyPr>
           <a:lstStyle>
             <a:lvl1pPr marL="0" indent="0">
-              <a:buNone/>
-              <a:defRPr sz="2400" b="1"/>
+              <a:spcBef>
+                <a:spcPts val="0"/>
+              </a:spcBef>
+              <a:buNone/>
+              <a:defRPr sz="2000" b="1">
+                <a:solidFill>
+                  <a:schemeClr val="tx1">
+                    <a:lumMod val="65000"/>
+                    <a:lumOff val="35000"/>
+                  </a:schemeClr>
+                </a:solidFill>
+              </a:defRPr>
             </a:lvl1pPr>
             <a:lvl2pPr marL="457200" indent="0">
               <a:buNone/>
@@ -2015,13 +2219,41 @@
         </p:nvSpPr>
         <p:spPr>
           <a:xfrm>
-            <a:off x="6172200" y="2505075"/>
-            <a:ext cx="5183188" cy="3684588"/>
+            <a:off x="7818463" y="1930936"/>
+            <a:ext cx="3474720" cy="4023360"/>
           </a:xfrm>
         </p:spPr>
         <p:txBody>
           <a:bodyPr/>
-          <a:lstStyle/>
+          <a:lstStyle>
+            <a:lvl1pPr>
+              <a:defRPr sz="2000"/>
+            </a:lvl1pPr>
+            <a:lvl2pPr>
+              <a:defRPr sz="1800"/>
+            </a:lvl2pPr>
+            <a:lvl3pPr>
+              <a:defRPr sz="1600"/>
+            </a:lvl3pPr>
+            <a:lvl4pPr>
+              <a:defRPr sz="1400"/>
+            </a:lvl4pPr>
+            <a:lvl5pPr>
+              <a:defRPr sz="1400"/>
+            </a:lvl5pPr>
+            <a:lvl6pPr>
+              <a:defRPr sz="1400"/>
+            </a:lvl6pPr>
+            <a:lvl7pPr>
+              <a:defRPr sz="1400"/>
+            </a:lvl7pPr>
+            <a:lvl8pPr>
+              <a:defRPr sz="1400"/>
+            </a:lvl8pPr>
+            <a:lvl9pPr>
+              <a:defRPr sz="1400"/>
+            </a:lvl9pPr>
+          </a:lstStyle>
           <a:p>
             <a:pPr lvl="0"/>
             <a:r>
@@ -2056,13 +2288,13 @@
               <a:rPr lang="en-US" altLang="ko-KR" smtClean="0"/>
               <a:t>Fifth level</a:t>
             </a:r>
-            <a:endParaRPr lang="ko-KR" altLang="en-US"/>
-          </a:p>
-        </p:txBody>
-      </p:sp>
-      <p:sp>
-        <p:nvSpPr>
-          <p:cNvPr id="7" name="Date Placeholder 6"/>
+            <a:endParaRPr lang="en-US" dirty="0"/>
+          </a:p>
+        </p:txBody>
+      </p:sp>
+      <p:sp>
+        <p:nvSpPr>
+          <p:cNvPr id="2" name="Date Placeholder 1"/>
           <p:cNvSpPr>
             <a:spLocks noGrp="1"/>
           </p:cNvSpPr>
@@ -2077,7 +2309,7 @@
           <a:p>
             <a:fld id="{3850A63D-0EEB-44F7-9147-334421329CD8}" type="datetimeFigureOut">
               <a:rPr lang="ko-KR" altLang="en-US" smtClean="0"/>
-              <a:t>2016-09-12</a:t>
+              <a:t>2016-09-13</a:t>
             </a:fld>
             <a:endParaRPr lang="ko-KR" altLang="en-US"/>
           </a:p>
@@ -2085,7 +2317,7 @@
       </p:sp>
       <p:sp>
         <p:nvSpPr>
-          <p:cNvPr id="8" name="Footer Placeholder 7"/>
+          <p:cNvPr id="11" name="Footer Placeholder 10"/>
           <p:cNvSpPr>
             <a:spLocks noGrp="1"/>
           </p:cNvSpPr>
@@ -2104,7 +2336,7 @@
       </p:sp>
       <p:sp>
         <p:nvSpPr>
-          <p:cNvPr id="9" name="Slide Number Placeholder 8"/>
+          <p:cNvPr id="12" name="Slide Number Placeholder 11"/>
           <p:cNvSpPr>
             <a:spLocks noGrp="1"/>
           </p:cNvSpPr>
@@ -2128,7 +2360,7 @@
     </p:spTree>
     <p:extLst>
       <p:ext uri="{BB962C8B-B14F-4D97-AF65-F5344CB8AC3E}">
-        <p14:creationId xmlns:p14="http://schemas.microsoft.com/office/powerpoint/2010/main" val="1347887799"/>
+        <p14:creationId xmlns:p14="http://schemas.microsoft.com/office/powerpoint/2010/main" val="3747838695"/>
       </p:ext>
     </p:extLst>
   </p:cSld>
@@ -2157,7 +2389,7 @@
       </p:grpSpPr>
       <p:sp>
         <p:nvSpPr>
-          <p:cNvPr id="2" name="Title 1"/>
+          <p:cNvPr id="6" name="Title 5"/>
           <p:cNvSpPr>
             <a:spLocks noGrp="1"/>
           </p:cNvSpPr>
@@ -2174,13 +2406,13 @@
               <a:rPr lang="en-US" altLang="ko-KR" smtClean="0"/>
               <a:t>Click to edit Master title style</a:t>
             </a:r>
-            <a:endParaRPr lang="ko-KR" altLang="en-US"/>
-          </a:p>
-        </p:txBody>
-      </p:sp>
-      <p:sp>
-        <p:nvSpPr>
-          <p:cNvPr id="3" name="Date Placeholder 2"/>
+            <a:endParaRPr lang="en-US" dirty="0"/>
+          </a:p>
+        </p:txBody>
+      </p:sp>
+      <p:sp>
+        <p:nvSpPr>
+          <p:cNvPr id="2" name="Date Placeholder 1"/>
           <p:cNvSpPr>
             <a:spLocks noGrp="1"/>
           </p:cNvSpPr>
@@ -2195,7 +2427,7 @@
           <a:p>
             <a:fld id="{3850A63D-0EEB-44F7-9147-334421329CD8}" type="datetimeFigureOut">
               <a:rPr lang="ko-KR" altLang="en-US" smtClean="0"/>
-              <a:t>2016-09-12</a:t>
+              <a:t>2016-09-13</a:t>
             </a:fld>
             <a:endParaRPr lang="ko-KR" altLang="en-US"/>
           </a:p>
@@ -2203,7 +2435,7 @@
       </p:sp>
       <p:sp>
         <p:nvSpPr>
-          <p:cNvPr id="4" name="Footer Placeholder 3"/>
+          <p:cNvPr id="7" name="Footer Placeholder 6"/>
           <p:cNvSpPr>
             <a:spLocks noGrp="1"/>
           </p:cNvSpPr>
@@ -2222,7 +2454,7 @@
       </p:sp>
       <p:sp>
         <p:nvSpPr>
-          <p:cNvPr id="5" name="Slide Number Placeholder 4"/>
+          <p:cNvPr id="8" name="Slide Number Placeholder 7"/>
           <p:cNvSpPr>
             <a:spLocks noGrp="1"/>
           </p:cNvSpPr>
@@ -2246,7 +2478,7 @@
     </p:spTree>
     <p:extLst>
       <p:ext uri="{BB962C8B-B14F-4D97-AF65-F5344CB8AC3E}">
-        <p14:creationId xmlns:p14="http://schemas.microsoft.com/office/powerpoint/2010/main" val="2564290036"/>
+        <p14:creationId xmlns:p14="http://schemas.microsoft.com/office/powerpoint/2010/main" val="3799573309"/>
       </p:ext>
     </p:extLst>
   </p:cSld>
@@ -2257,7 +2489,7 @@
 </file>
 
 <file path=ppt/slideLayouts/slideLayout7.xml><?xml version="1.0" encoding="utf-8"?>
-<p:sldLayout xmlns:a="http://schemas.openxmlformats.org/drawingml/2006/main" xmlns:r="http://schemas.openxmlformats.org/officeDocument/2006/relationships" xmlns:p="http://schemas.openxmlformats.org/presentationml/2006/main" type="blank" preserve="1">
+<p:sldLayout xmlns:a="http://schemas.openxmlformats.org/drawingml/2006/main" xmlns:r="http://schemas.openxmlformats.org/officeDocument/2006/relationships" xmlns:p="http://schemas.openxmlformats.org/presentationml/2006/main" showMasterSp="0" type="blank" preserve="1">
   <p:cSld name="Blank">
     <p:spTree>
       <p:nvGrpSpPr>
@@ -2275,7 +2507,7 @@
       </p:grpSpPr>
       <p:sp>
         <p:nvSpPr>
-          <p:cNvPr id="2" name="Date Placeholder 1"/>
+          <p:cNvPr id="5" name="Date Placeholder 4"/>
           <p:cNvSpPr>
             <a:spLocks noGrp="1"/>
           </p:cNvSpPr>
@@ -2290,7 +2522,7 @@
           <a:p>
             <a:fld id="{3850A63D-0EEB-44F7-9147-334421329CD8}" type="datetimeFigureOut">
               <a:rPr lang="ko-KR" altLang="en-US" smtClean="0"/>
-              <a:t>2016-09-12</a:t>
+              <a:t>2016-09-13</a:t>
             </a:fld>
             <a:endParaRPr lang="ko-KR" altLang="en-US"/>
           </a:p>
@@ -2298,7 +2530,7 @@
       </p:sp>
       <p:sp>
         <p:nvSpPr>
-          <p:cNvPr id="3" name="Footer Placeholder 2"/>
+          <p:cNvPr id="6" name="Footer Placeholder 5"/>
           <p:cNvSpPr>
             <a:spLocks noGrp="1"/>
           </p:cNvSpPr>
@@ -2317,7 +2549,7 @@
       </p:sp>
       <p:sp>
         <p:nvSpPr>
-          <p:cNvPr id="4" name="Slide Number Placeholder 3"/>
+          <p:cNvPr id="7" name="Slide Number Placeholder 6"/>
           <p:cNvSpPr>
             <a:spLocks noGrp="1"/>
           </p:cNvSpPr>
@@ -2341,7 +2573,7 @@
     </p:spTree>
     <p:extLst>
       <p:ext uri="{BB962C8B-B14F-4D97-AF65-F5344CB8AC3E}">
-        <p14:creationId xmlns:p14="http://schemas.microsoft.com/office/powerpoint/2010/main" val="1637173770"/>
+        <p14:creationId xmlns:p14="http://schemas.microsoft.com/office/powerpoint/2010/main" val="1055303911"/>
       </p:ext>
     </p:extLst>
   </p:cSld>
@@ -2380,15 +2612,17 @@
         </p:nvSpPr>
         <p:spPr>
           <a:xfrm>
-            <a:off x="839788" y="457200"/>
-            <a:ext cx="3932237" cy="1600200"/>
+            <a:off x="256032" y="1143000"/>
+            <a:ext cx="2834640" cy="2377440"/>
           </a:xfrm>
         </p:spPr>
         <p:txBody>
-          <a:bodyPr anchor="b"/>
+          <a:bodyPr anchor="b">
+            <a:normAutofit/>
+          </a:bodyPr>
           <a:lstStyle>
             <a:lvl1pPr>
-              <a:defRPr sz="3200"/>
+              <a:defRPr sz="3200" b="0" baseline="0"/>
             </a:lvl1pPr>
           </a:lstStyle>
           <a:p>
@@ -2396,7 +2630,7 @@
               <a:rPr lang="en-US" altLang="ko-KR" smtClean="0"/>
               <a:t>Click to edit Master title style</a:t>
             </a:r>
-            <a:endParaRPr lang="ko-KR" altLang="en-US"/>
+            <a:endParaRPr lang="en-US" dirty="0"/>
           </a:p>
         </p:txBody>
       </p:sp>
@@ -2412,39 +2646,39 @@
         </p:nvSpPr>
         <p:spPr>
           <a:xfrm>
-            <a:off x="5183188" y="987425"/>
-            <a:ext cx="6172200" cy="4873625"/>
+            <a:off x="3867912" y="868680"/>
+            <a:ext cx="7315200" cy="5120640"/>
           </a:xfrm>
         </p:spPr>
         <p:txBody>
           <a:bodyPr/>
           <a:lstStyle>
             <a:lvl1pPr>
-              <a:defRPr sz="3200"/>
+              <a:defRPr sz="2000"/>
             </a:lvl1pPr>
             <a:lvl2pPr>
-              <a:defRPr sz="2800"/>
+              <a:defRPr sz="1800"/>
             </a:lvl2pPr>
             <a:lvl3pPr>
-              <a:defRPr sz="2400"/>
+              <a:defRPr sz="1600"/>
             </a:lvl3pPr>
             <a:lvl4pPr>
-              <a:defRPr sz="2000"/>
+              <a:defRPr sz="1400"/>
             </a:lvl4pPr>
             <a:lvl5pPr>
-              <a:defRPr sz="2000"/>
+              <a:defRPr sz="1400"/>
             </a:lvl5pPr>
             <a:lvl6pPr>
-              <a:defRPr sz="2000"/>
+              <a:defRPr sz="1400"/>
             </a:lvl6pPr>
             <a:lvl7pPr>
-              <a:defRPr sz="2000"/>
+              <a:defRPr sz="1400"/>
             </a:lvl7pPr>
             <a:lvl8pPr>
-              <a:defRPr sz="2000"/>
+              <a:defRPr sz="1400"/>
             </a:lvl8pPr>
             <a:lvl9pPr>
-              <a:defRPr sz="2000"/>
+              <a:defRPr sz="1400"/>
             </a:lvl9pPr>
           </a:lstStyle>
           <a:p>
@@ -2481,7 +2715,7 @@
               <a:rPr lang="en-US" altLang="ko-KR" smtClean="0"/>
               <a:t>Fifth level</a:t>
             </a:r>
-            <a:endParaRPr lang="ko-KR" altLang="en-US"/>
+            <a:endParaRPr lang="en-US" dirty="0"/>
           </a:p>
         </p:txBody>
       </p:sp>
@@ -2497,48 +2731,57 @@
         </p:nvSpPr>
         <p:spPr>
           <a:xfrm>
-            <a:off x="839788" y="2057400"/>
-            <a:ext cx="3932237" cy="3811588"/>
+            <a:off x="256032" y="3494176"/>
+            <a:ext cx="2834640" cy="2321990"/>
           </a:xfrm>
         </p:spPr>
         <p:txBody>
-          <a:bodyPr/>
+          <a:bodyPr anchor="t">
+            <a:normAutofit/>
+          </a:bodyPr>
           <a:lstStyle>
             <a:lvl1pPr marL="0" indent="0">
-              <a:buNone/>
-              <a:defRPr sz="1600"/>
+              <a:lnSpc>
+                <a:spcPct val="100000"/>
+              </a:lnSpc>
+              <a:buNone/>
+              <a:defRPr sz="1400">
+                <a:solidFill>
+                  <a:srgbClr val="FFFFFF"/>
+                </a:solidFill>
+              </a:defRPr>
             </a:lvl1pPr>
             <a:lvl2pPr marL="457200" indent="0">
               <a:buNone/>
-              <a:defRPr sz="1400"/>
+              <a:defRPr sz="1200"/>
             </a:lvl2pPr>
             <a:lvl3pPr marL="914400" indent="0">
               <a:buNone/>
-              <a:defRPr sz="1200"/>
+              <a:defRPr sz="1000"/>
             </a:lvl3pPr>
             <a:lvl4pPr marL="1371600" indent="0">
               <a:buNone/>
-              <a:defRPr sz="1000"/>
+              <a:defRPr sz="900"/>
             </a:lvl4pPr>
             <a:lvl5pPr marL="1828800" indent="0">
               <a:buNone/>
-              <a:defRPr sz="1000"/>
+              <a:defRPr sz="900"/>
             </a:lvl5pPr>
             <a:lvl6pPr marL="2286000" indent="0">
               <a:buNone/>
-              <a:defRPr sz="1000"/>
+              <a:defRPr sz="900"/>
             </a:lvl6pPr>
             <a:lvl7pPr marL="2743200" indent="0">
               <a:buNone/>
-              <a:defRPr sz="1000"/>
+              <a:defRPr sz="900"/>
             </a:lvl7pPr>
             <a:lvl8pPr marL="3200400" indent="0">
               <a:buNone/>
-              <a:defRPr sz="1000"/>
+              <a:defRPr sz="900"/>
             </a:lvl8pPr>
             <a:lvl9pPr marL="3657600" indent="0">
               <a:buNone/>
-              <a:defRPr sz="1000"/>
+              <a:defRPr sz="900"/>
             </a:lvl9pPr>
           </a:lstStyle>
           <a:p>
@@ -2552,7 +2795,7 @@
       </p:sp>
       <p:sp>
         <p:nvSpPr>
-          <p:cNvPr id="5" name="Date Placeholder 4"/>
+          <p:cNvPr id="8" name="Date Placeholder 7"/>
           <p:cNvSpPr>
             <a:spLocks noGrp="1"/>
           </p:cNvSpPr>
@@ -2567,7 +2810,7 @@
           <a:p>
             <a:fld id="{3850A63D-0EEB-44F7-9147-334421329CD8}" type="datetimeFigureOut">
               <a:rPr lang="ko-KR" altLang="en-US" smtClean="0"/>
-              <a:t>2016-09-12</a:t>
+              <a:t>2016-09-13</a:t>
             </a:fld>
             <a:endParaRPr lang="ko-KR" altLang="en-US"/>
           </a:p>
@@ -2575,7 +2818,7 @@
       </p:sp>
       <p:sp>
         <p:nvSpPr>
-          <p:cNvPr id="6" name="Footer Placeholder 5"/>
+          <p:cNvPr id="9" name="Footer Placeholder 8"/>
           <p:cNvSpPr>
             <a:spLocks noGrp="1"/>
           </p:cNvSpPr>
@@ -2594,7 +2837,7 @@
       </p:sp>
       <p:sp>
         <p:nvSpPr>
-          <p:cNvPr id="7" name="Slide Number Placeholder 6"/>
+          <p:cNvPr id="10" name="Slide Number Placeholder 9"/>
           <p:cNvSpPr>
             <a:spLocks noGrp="1"/>
           </p:cNvSpPr>
@@ -2618,7 +2861,7 @@
     </p:spTree>
     <p:extLst>
       <p:ext uri="{BB962C8B-B14F-4D97-AF65-F5344CB8AC3E}">
-        <p14:creationId xmlns:p14="http://schemas.microsoft.com/office/powerpoint/2010/main" val="3555424353"/>
+        <p14:creationId xmlns:p14="http://schemas.microsoft.com/office/powerpoint/2010/main" val="2027179692"/>
       </p:ext>
     </p:extLst>
   </p:cSld>
@@ -2657,15 +2900,17 @@
         </p:nvSpPr>
         <p:spPr>
           <a:xfrm>
-            <a:off x="839788" y="457200"/>
-            <a:ext cx="3932237" cy="1600200"/>
+            <a:off x="256032" y="1143000"/>
+            <a:ext cx="2834640" cy="2377440"/>
           </a:xfrm>
         </p:spPr>
         <p:txBody>
-          <a:bodyPr anchor="b"/>
+          <a:bodyPr anchor="b">
+            <a:normAutofit/>
+          </a:bodyPr>
           <a:lstStyle>
             <a:lvl1pPr>
-              <a:defRPr sz="3200"/>
+              <a:defRPr sz="3200" b="0"/>
             </a:lvl1pPr>
           </a:lstStyle>
           <a:p>
@@ -2673,7 +2918,7 @@
               <a:rPr lang="en-US" altLang="ko-KR" smtClean="0"/>
               <a:t>Click to edit Master title style</a:t>
             </a:r>
-            <a:endParaRPr lang="ko-KR" altLang="en-US"/>
+            <a:endParaRPr lang="en-US" dirty="0"/>
           </a:p>
         </p:txBody>
       </p:sp>
@@ -2681,7 +2926,7 @@
         <p:nvSpPr>
           <p:cNvPr id="3" name="Picture Placeholder 2"/>
           <p:cNvSpPr>
-            <a:spLocks noGrp="1"/>
+            <a:spLocks noGrp="1" noChangeAspect="1"/>
           </p:cNvSpPr>
           <p:nvPr>
             <p:ph type="pic" idx="1"/>
@@ -2689,12 +2934,17 @@
         </p:nvSpPr>
         <p:spPr>
           <a:xfrm>
-            <a:off x="5183188" y="987425"/>
-            <a:ext cx="6172200" cy="4873625"/>
+            <a:off x="3570644" y="767419"/>
+            <a:ext cx="8115230" cy="5330952"/>
           </a:xfrm>
+          <a:solidFill>
+            <a:schemeClr val="bg1">
+              <a:lumMod val="75000"/>
+            </a:schemeClr>
+          </a:solidFill>
         </p:spPr>
         <p:txBody>
-          <a:bodyPr/>
+          <a:bodyPr anchor="t"/>
           <a:lstStyle>
             <a:lvl1pPr marL="0" indent="0">
               <a:buNone/>
@@ -2734,7 +2984,11 @@
             </a:lvl9pPr>
           </a:lstStyle>
           <a:p>
-            <a:endParaRPr lang="ko-KR" altLang="en-US"/>
+            <a:r>
+              <a:rPr lang="en-US" altLang="ko-KR" smtClean="0"/>
+              <a:t>Click icon to add picture</a:t>
+            </a:r>
+            <a:endParaRPr lang="en-US" dirty="0"/>
           </a:p>
         </p:txBody>
       </p:sp>
@@ -2750,48 +3004,57 @@
         </p:nvSpPr>
         <p:spPr>
           <a:xfrm>
-            <a:off x="839788" y="2057400"/>
-            <a:ext cx="3932237" cy="3811588"/>
+            <a:off x="256032" y="3493008"/>
+            <a:ext cx="2834640" cy="2322576"/>
           </a:xfrm>
         </p:spPr>
         <p:txBody>
-          <a:bodyPr/>
+          <a:bodyPr anchor="t">
+            <a:normAutofit/>
+          </a:bodyPr>
           <a:lstStyle>
             <a:lvl1pPr marL="0" indent="0">
-              <a:buNone/>
-              <a:defRPr sz="1600"/>
+              <a:lnSpc>
+                <a:spcPct val="100000"/>
+              </a:lnSpc>
+              <a:buNone/>
+              <a:defRPr sz="1400">
+                <a:solidFill>
+                  <a:srgbClr val="FFFFFF"/>
+                </a:solidFill>
+              </a:defRPr>
             </a:lvl1pPr>
             <a:lvl2pPr marL="457200" indent="0">
               <a:buNone/>
-              <a:defRPr sz="1400"/>
+              <a:defRPr sz="1200"/>
             </a:lvl2pPr>
             <a:lvl3pPr marL="914400" indent="0">
               <a:buNone/>
-              <a:defRPr sz="1200"/>
+              <a:defRPr sz="1000"/>
             </a:lvl3pPr>
             <a:lvl4pPr marL="1371600" indent="0">
               <a:buNone/>
-              <a:defRPr sz="1000"/>
+              <a:defRPr sz="900"/>
             </a:lvl4pPr>
             <a:lvl5pPr marL="1828800" indent="0">
               <a:buNone/>
-              <a:defRPr sz="1000"/>
+              <a:defRPr sz="900"/>
             </a:lvl5pPr>
             <a:lvl6pPr marL="2286000" indent="0">
               <a:buNone/>
-              <a:defRPr sz="1000"/>
+              <a:defRPr sz="900"/>
             </a:lvl6pPr>
             <a:lvl7pPr marL="2743200" indent="0">
               <a:buNone/>
-              <a:defRPr sz="1000"/>
+              <a:defRPr sz="900"/>
             </a:lvl7pPr>
             <a:lvl8pPr marL="3200400" indent="0">
               <a:buNone/>
-              <a:defRPr sz="1000"/>
+              <a:defRPr sz="900"/>
             </a:lvl8pPr>
             <a:lvl9pPr marL="3657600" indent="0">
               <a:buNone/>
-              <a:defRPr sz="1000"/>
+              <a:defRPr sz="900"/>
             </a:lvl9pPr>
           </a:lstStyle>
           <a:p>
@@ -2805,7 +3068,7 @@
       </p:sp>
       <p:sp>
         <p:nvSpPr>
-          <p:cNvPr id="5" name="Date Placeholder 4"/>
+          <p:cNvPr id="8" name="Date Placeholder 7"/>
           <p:cNvSpPr>
             <a:spLocks noGrp="1"/>
           </p:cNvSpPr>
@@ -2820,7 +3083,7 @@
           <a:p>
             <a:fld id="{3850A63D-0EEB-44F7-9147-334421329CD8}" type="datetimeFigureOut">
               <a:rPr lang="ko-KR" altLang="en-US" smtClean="0"/>
-              <a:t>2016-09-12</a:t>
+              <a:t>2016-09-13</a:t>
             </a:fld>
             <a:endParaRPr lang="ko-KR" altLang="en-US"/>
           </a:p>
@@ -2828,7 +3091,7 @@
       </p:sp>
       <p:sp>
         <p:nvSpPr>
-          <p:cNvPr id="6" name="Footer Placeholder 5"/>
+          <p:cNvPr id="9" name="Footer Placeholder 8"/>
           <p:cNvSpPr>
             <a:spLocks noGrp="1"/>
           </p:cNvSpPr>
@@ -2836,7 +3099,12 @@
             <p:ph type="ftr" sz="quarter" idx="11"/>
           </p:nvPr>
         </p:nvSpPr>
-        <p:spPr/>
+        <p:spPr>
+          <a:xfrm>
+            <a:off x="3499101" y="6356350"/>
+            <a:ext cx="5911517" cy="365125"/>
+          </a:xfrm>
+        </p:spPr>
         <p:txBody>
           <a:bodyPr/>
           <a:lstStyle/>
@@ -2847,7 +3115,7 @@
       </p:sp>
       <p:sp>
         <p:nvSpPr>
-          <p:cNvPr id="7" name="Slide Number Placeholder 6"/>
+          <p:cNvPr id="10" name="Slide Number Placeholder 9"/>
           <p:cNvSpPr>
             <a:spLocks noGrp="1"/>
           </p:cNvSpPr>
@@ -2871,7 +3139,7 @@
     </p:spTree>
     <p:extLst>
       <p:ext uri="{BB962C8B-B14F-4D97-AF65-F5344CB8AC3E}">
-        <p14:creationId xmlns:p14="http://schemas.microsoft.com/office/powerpoint/2010/main" val="3332900074"/>
+        <p14:creationId xmlns:p14="http://schemas.microsoft.com/office/powerpoint/2010/main" val="4127010725"/>
       </p:ext>
     </p:extLst>
   </p:cSld>
@@ -2905,18 +3173,56 @@
       </p:grpSpPr>
       <p:sp>
         <p:nvSpPr>
-          <p:cNvPr id="2" name="Title Placeholder 1"/>
-          <p:cNvSpPr>
-            <a:spLocks noGrp="1"/>
-          </p:cNvSpPr>
-          <p:nvPr>
-            <p:ph type="title"/>
-          </p:nvPr>
+          <p:cNvPr id="7" name="Rectangle 6"/>
+          <p:cNvSpPr/>
+          <p:nvPr/>
         </p:nvSpPr>
         <p:spPr>
           <a:xfrm>
-            <a:off x="838200" y="365125"/>
-            <a:ext cx="10515600" cy="1325563"/>
+            <a:off x="1" y="758952"/>
+            <a:ext cx="3443590" cy="5330952"/>
+          </a:xfrm>
+          <a:prstGeom prst="rect">
+            <a:avLst/>
+          </a:prstGeom>
+          <a:solidFill>
+            <a:schemeClr val="accent1"/>
+          </a:solidFill>
+          <a:ln>
+            <a:noFill/>
+          </a:ln>
+        </p:spPr>
+        <p:style>
+          <a:lnRef idx="2">
+            <a:schemeClr val="accent1">
+              <a:shade val="50000"/>
+            </a:schemeClr>
+          </a:lnRef>
+          <a:fillRef idx="1">
+            <a:schemeClr val="accent1"/>
+          </a:fillRef>
+          <a:effectRef idx="0">
+            <a:schemeClr val="accent1"/>
+          </a:effectRef>
+          <a:fontRef idx="minor">
+            <a:schemeClr val="lt1"/>
+          </a:fontRef>
+        </p:style>
+      </p:sp>
+      <p:sp>
+        <p:nvSpPr>
+          <p:cNvPr id="2" name="Title Placeholder 1"/>
+          <p:cNvSpPr>
+            <a:spLocks noGrp="1"/>
+          </p:cNvSpPr>
+          <p:nvPr>
+            <p:ph type="title"/>
+          </p:nvPr>
+        </p:nvSpPr>
+        <p:spPr>
+          <a:xfrm>
+            <a:off x="252919" y="1123837"/>
+            <a:ext cx="2947482" cy="4601183"/>
           </a:xfrm>
           <a:prstGeom prst="rect">
             <a:avLst/>
@@ -2932,31 +3238,71 @@
               <a:rPr lang="en-US" altLang="ko-KR" smtClean="0"/>
               <a:t>Click to edit Master title style</a:t>
             </a:r>
-            <a:endParaRPr lang="ko-KR" altLang="en-US"/>
-          </a:p>
-        </p:txBody>
-      </p:sp>
-      <p:sp>
-        <p:nvSpPr>
-          <p:cNvPr id="3" name="Text Placeholder 2"/>
-          <p:cNvSpPr>
-            <a:spLocks noGrp="1"/>
-          </p:cNvSpPr>
-          <p:nvPr>
-            <p:ph type="body" idx="1"/>
-          </p:nvPr>
+            <a:endParaRPr lang="en-US" dirty="0"/>
+          </a:p>
+        </p:txBody>
+      </p:sp>
+      <p:sp>
+        <p:nvSpPr>
+          <p:cNvPr id="38" name="Rectangle 37"/>
+          <p:cNvSpPr/>
+          <p:nvPr/>
         </p:nvSpPr>
         <p:spPr>
           <a:xfrm>
-            <a:off x="838200" y="1825625"/>
-            <a:ext cx="10515600" cy="4351338"/>
+            <a:off x="11815864" y="758952"/>
+            <a:ext cx="384048" cy="5330952"/>
+          </a:xfrm>
+          <a:prstGeom prst="rect">
+            <a:avLst/>
+          </a:prstGeom>
+          <a:solidFill>
+            <a:srgbClr val="C8C8C8">
+              <a:alpha val="49804"/>
+            </a:srgbClr>
+          </a:solidFill>
+          <a:ln>
+            <a:noFill/>
+          </a:ln>
+        </p:spPr>
+        <p:style>
+          <a:lnRef idx="2">
+            <a:schemeClr val="accent1">
+              <a:shade val="50000"/>
+            </a:schemeClr>
+          </a:lnRef>
+          <a:fillRef idx="1">
+            <a:schemeClr val="accent1"/>
+          </a:fillRef>
+          <a:effectRef idx="0">
+            <a:schemeClr val="accent1"/>
+          </a:effectRef>
+          <a:fontRef idx="minor">
+            <a:schemeClr val="lt1"/>
+          </a:fontRef>
+        </p:style>
+      </p:sp>
+      <p:sp>
+        <p:nvSpPr>
+          <p:cNvPr id="3" name="Text Placeholder 2"/>
+          <p:cNvSpPr>
+            <a:spLocks noGrp="1"/>
+          </p:cNvSpPr>
+          <p:nvPr>
+            <p:ph type="body" idx="1"/>
+          </p:nvPr>
+        </p:nvSpPr>
+        <p:spPr>
+          <a:xfrm>
+            <a:off x="3869268" y="864108"/>
+            <a:ext cx="7315200" cy="5120640"/>
           </a:xfrm>
           <a:prstGeom prst="rect">
             <a:avLst/>
           </a:prstGeom>
         </p:spPr>
         <p:txBody>
-          <a:bodyPr vert="horz" lIns="91440" tIns="45720" rIns="91440" bIns="45720" rtlCol="0">
+          <a:bodyPr vert="horz" lIns="91440" tIns="45720" rIns="91440" bIns="45720" rtlCol="0" anchor="ctr">
             <a:normAutofit/>
           </a:bodyPr>
           <a:lstStyle/>
@@ -2994,7 +3340,7 @@
               <a:rPr lang="en-US" altLang="ko-KR" smtClean="0"/>
               <a:t>Fifth level</a:t>
             </a:r>
-            <a:endParaRPr lang="ko-KR" altLang="en-US"/>
+            <a:endParaRPr lang="en-US" dirty="0"/>
           </a:p>
         </p:txBody>
       </p:sp>
@@ -3010,7 +3356,7 @@
         </p:nvSpPr>
         <p:spPr>
           <a:xfrm>
-            <a:off x="838200" y="6356350"/>
+            <a:off x="262465" y="6356350"/>
             <a:ext cx="2743200" cy="365125"/>
           </a:xfrm>
           <a:prstGeom prst="rect">
@@ -3021,10 +3367,11 @@
           <a:bodyPr vert="horz" lIns="91440" tIns="45720" rIns="91440" bIns="45720" rtlCol="0" anchor="ctr"/>
           <a:lstStyle>
             <a:lvl1pPr algn="l">
-              <a:defRPr sz="1200">
+              <a:defRPr sz="1100">
                 <a:solidFill>
                   <a:schemeClr val="tx1">
-                    <a:tint val="75000"/>
+                    <a:lumMod val="50000"/>
+                    <a:lumOff val="50000"/>
                   </a:schemeClr>
                 </a:solidFill>
               </a:defRPr>
@@ -3033,7 +3380,7 @@
           <a:p>
             <a:fld id="{3850A63D-0EEB-44F7-9147-334421329CD8}" type="datetimeFigureOut">
               <a:rPr lang="ko-KR" altLang="en-US" smtClean="0"/>
-              <a:t>2016-09-12</a:t>
+              <a:t>2016-09-13</a:t>
             </a:fld>
             <a:endParaRPr lang="ko-KR" altLang="en-US"/>
           </a:p>
@@ -3051,8 +3398,8 @@
         </p:nvSpPr>
         <p:spPr>
           <a:xfrm>
-            <a:off x="4038600" y="6356350"/>
-            <a:ext cx="4114800" cy="365125"/>
+            <a:off x="3869268" y="6356350"/>
+            <a:ext cx="5911517" cy="365125"/>
           </a:xfrm>
           <a:prstGeom prst="rect">
             <a:avLst/>
@@ -3061,11 +3408,12 @@
         <p:txBody>
           <a:bodyPr vert="horz" lIns="91440" tIns="45720" rIns="91440" bIns="45720" rtlCol="0" anchor="ctr"/>
           <a:lstStyle>
-            <a:lvl1pPr algn="ctr">
-              <a:defRPr sz="1200">
+            <a:lvl1pPr algn="l">
+              <a:defRPr sz="1100">
                 <a:solidFill>
                   <a:schemeClr val="tx1">
-                    <a:tint val="75000"/>
+                    <a:lumMod val="50000"/>
+                    <a:lumOff val="50000"/>
                   </a:schemeClr>
                 </a:solidFill>
               </a:defRPr>
@@ -3088,8 +3436,8 @@
         </p:nvSpPr>
         <p:spPr>
           <a:xfrm>
-            <a:off x="8610600" y="6356350"/>
-            <a:ext cx="2743200" cy="365125"/>
+            <a:off x="10634135" y="6356350"/>
+            <a:ext cx="1530927" cy="365125"/>
           </a:xfrm>
           <a:prstGeom prst="rect">
             <a:avLst/>
@@ -3099,11 +3447,9 @@
           <a:bodyPr vert="horz" lIns="91440" tIns="45720" rIns="91440" bIns="45720" rtlCol="0" anchor="ctr"/>
           <a:lstStyle>
             <a:lvl1pPr algn="r">
-              <a:defRPr sz="1200">
+              <a:defRPr sz="1200" b="1">
                 <a:solidFill>
-                  <a:schemeClr val="tx1">
-                    <a:tint val="75000"/>
-                  </a:schemeClr>
+                  <a:schemeClr val="accent1"/>
                 </a:solidFill>
               </a:defRPr>
             </a:lvl1pPr>
@@ -3120,23 +3466,23 @@
     </p:spTree>
     <p:extLst>
       <p:ext uri="{BB962C8B-B14F-4D97-AF65-F5344CB8AC3E}">
-        <p14:creationId xmlns:p14="http://schemas.microsoft.com/office/powerpoint/2010/main" val="2819989487"/>
+        <p14:creationId xmlns:p14="http://schemas.microsoft.com/office/powerpoint/2010/main" val="3310544988"/>
       </p:ext>
     </p:extLst>
   </p:cSld>
   <p:clrMap bg1="lt1" tx1="dk1" bg2="lt2" tx2="dk2" accent1="accent1" accent2="accent2" accent3="accent3" accent4="accent4" accent5="accent5" accent6="accent6" hlink="hlink" folHlink="folHlink"/>
   <p:sldLayoutIdLst>
-    <p:sldLayoutId id="2147483649" r:id="rId1"/>
-    <p:sldLayoutId id="2147483650" r:id="rId2"/>
-    <p:sldLayoutId id="2147483651" r:id="rId3"/>
-    <p:sldLayoutId id="2147483652" r:id="rId4"/>
-    <p:sldLayoutId id="2147483653" r:id="rId5"/>
-    <p:sldLayoutId id="2147483654" r:id="rId6"/>
-    <p:sldLayoutId id="2147483655" r:id="rId7"/>
-    <p:sldLayoutId id="2147483656" r:id="rId8"/>
-    <p:sldLayoutId id="2147483657" r:id="rId9"/>
-    <p:sldLayoutId id="2147483658" r:id="rId10"/>
-    <p:sldLayoutId id="2147483659" r:id="rId11"/>
+    <p:sldLayoutId id="2147483673" r:id="rId1"/>
+    <p:sldLayoutId id="2147483674" r:id="rId2"/>
+    <p:sldLayoutId id="2147483675" r:id="rId3"/>
+    <p:sldLayoutId id="2147483676" r:id="rId4"/>
+    <p:sldLayoutId id="2147483677" r:id="rId5"/>
+    <p:sldLayoutId id="2147483678" r:id="rId6"/>
+    <p:sldLayoutId id="2147483679" r:id="rId7"/>
+    <p:sldLayoutId id="2147483680" r:id="rId8"/>
+    <p:sldLayoutId id="2147483681" r:id="rId9"/>
+    <p:sldLayoutId id="2147483682" r:id="rId10"/>
+    <p:sldLayoutId id="2147483683" r:id="rId11"/>
   </p:sldLayoutIdLst>
   <p:txStyles>
     <p:titleStyle>
@@ -3148,9 +3494,9 @@
           <a:spcPct val="0"/>
         </a:spcBef>
         <a:buNone/>
-        <a:defRPr sz="4400" kern="1200">
+        <a:defRPr sz="3600" kern="1200" spc="-60" baseline="0">
           <a:solidFill>
-            <a:schemeClr val="tx1"/>
+            <a:srgbClr val="FFFFFF"/>
           </a:solidFill>
           <a:latin typeface="+mj-lt"/>
           <a:ea typeface="+mj-ea"/>
@@ -3159,90 +3505,132 @@
       </a:lvl1pPr>
     </p:titleStyle>
     <p:bodyStyle>
-      <a:lvl1pPr marL="228600" indent="-228600" algn="l" defTabSz="914400" rtl="0" eaLnBrk="1" latinLnBrk="1" hangingPunct="1">
+      <a:lvl1pPr marL="182880" indent="-182880" algn="l" defTabSz="914400" rtl="0" eaLnBrk="1" latinLnBrk="1" hangingPunct="1">
         <a:lnSpc>
           <a:spcPct val="90000"/>
         </a:lnSpc>
         <a:spcBef>
-          <a:spcPts val="1000"/>
+          <a:spcPts val="1200"/>
         </a:spcBef>
-        <a:buFont typeface="Arial" panose="020B0604020202020204" pitchFamily="34" charset="0"/>
-        <a:buChar char="•"/>
-        <a:defRPr sz="2800" kern="1200">
+        <a:buClr>
+          <a:schemeClr val="accent1"/>
+        </a:buClr>
+        <a:buFont typeface="Wingdings 2" pitchFamily="18" charset="2"/>
+        <a:buChar char=""/>
+        <a:defRPr sz="2000" kern="1200">
           <a:solidFill>
-            <a:schemeClr val="tx1"/>
+            <a:schemeClr val="tx1">
+              <a:lumMod val="75000"/>
+              <a:lumOff val="25000"/>
+            </a:schemeClr>
           </a:solidFill>
           <a:latin typeface="+mn-lt"/>
           <a:ea typeface="+mn-ea"/>
           <a:cs typeface="+mn-cs"/>
         </a:defRPr>
       </a:lvl1pPr>
-      <a:lvl2pPr marL="685800" indent="-228600" algn="l" defTabSz="914400" rtl="0" eaLnBrk="1" latinLnBrk="1" hangingPunct="1">
+      <a:lvl2pPr marL="685800" indent="-182880" algn="l" defTabSz="914400" rtl="0" eaLnBrk="1" latinLnBrk="1" hangingPunct="1">
         <a:lnSpc>
           <a:spcPct val="90000"/>
         </a:lnSpc>
         <a:spcBef>
-          <a:spcPts val="500"/>
+          <a:spcPts val="250"/>
         </a:spcBef>
-        <a:buFont typeface="Arial" panose="020B0604020202020204" pitchFamily="34" charset="0"/>
-        <a:buChar char="•"/>
-        <a:defRPr sz="2400" kern="1200">
+        <a:spcAft>
+          <a:spcPts val="250"/>
+        </a:spcAft>
+        <a:buClr>
+          <a:schemeClr val="accent1"/>
+        </a:buClr>
+        <a:buFont typeface="Wingdings 2" pitchFamily="18" charset="2"/>
+        <a:buChar char=""/>
+        <a:defRPr sz="1800" kern="1200">
           <a:solidFill>
-            <a:schemeClr val="tx1"/>
+            <a:schemeClr val="tx1">
+              <a:lumMod val="75000"/>
+              <a:lumOff val="25000"/>
+            </a:schemeClr>
           </a:solidFill>
           <a:latin typeface="+mn-lt"/>
           <a:ea typeface="+mn-ea"/>
           <a:cs typeface="+mn-cs"/>
         </a:defRPr>
       </a:lvl2pPr>
-      <a:lvl3pPr marL="1143000" indent="-228600" algn="l" defTabSz="914400" rtl="0" eaLnBrk="1" latinLnBrk="1" hangingPunct="1">
+      <a:lvl3pPr marL="1143000" indent="-182880" algn="l" defTabSz="914400" rtl="0" eaLnBrk="1" latinLnBrk="1" hangingPunct="1">
         <a:lnSpc>
           <a:spcPct val="90000"/>
         </a:lnSpc>
         <a:spcBef>
-          <a:spcPts val="500"/>
+          <a:spcPts val="250"/>
         </a:spcBef>
-        <a:buFont typeface="Arial" panose="020B0604020202020204" pitchFamily="34" charset="0"/>
-        <a:buChar char="•"/>
-        <a:defRPr sz="2000" kern="1200">
+        <a:spcAft>
+          <a:spcPts val="250"/>
+        </a:spcAft>
+        <a:buClr>
+          <a:schemeClr val="accent1"/>
+        </a:buClr>
+        <a:buFont typeface="Wingdings 2" pitchFamily="18" charset="2"/>
+        <a:buChar char=""/>
+        <a:defRPr sz="1600" kern="1200">
           <a:solidFill>
-            <a:schemeClr val="tx1"/>
+            <a:schemeClr val="tx1">
+              <a:lumMod val="75000"/>
+              <a:lumOff val="25000"/>
+            </a:schemeClr>
           </a:solidFill>
           <a:latin typeface="+mn-lt"/>
           <a:ea typeface="+mn-ea"/>
           <a:cs typeface="+mn-cs"/>
         </a:defRPr>
       </a:lvl3pPr>
-      <a:lvl4pPr marL="1600200" indent="-228600" algn="l" defTabSz="914400" rtl="0" eaLnBrk="1" latinLnBrk="1" hangingPunct="1">
+      <a:lvl4pPr marL="1600200" indent="-182880" algn="l" defTabSz="914400" rtl="0" eaLnBrk="1" latinLnBrk="1" hangingPunct="1">
         <a:lnSpc>
           <a:spcPct val="90000"/>
         </a:lnSpc>
         <a:spcBef>
-          <a:spcPts val="500"/>
+          <a:spcPts val="250"/>
         </a:spcBef>
-        <a:buFont typeface="Arial" panose="020B0604020202020204" pitchFamily="34" charset="0"/>
-        <a:buChar char="•"/>
-        <a:defRPr sz="1800" kern="1200">
+        <a:spcAft>
+          <a:spcPts val="250"/>
+        </a:spcAft>
+        <a:buClr>
+          <a:schemeClr val="accent1"/>
+        </a:buClr>
+        <a:buFont typeface="Wingdings 2" pitchFamily="18" charset="2"/>
+        <a:buChar char=""/>
+        <a:defRPr sz="1400" kern="1200">
           <a:solidFill>
-            <a:schemeClr val="tx1"/>
+            <a:schemeClr val="tx1">
+              <a:lumMod val="75000"/>
+              <a:lumOff val="25000"/>
+            </a:schemeClr>
           </a:solidFill>
           <a:latin typeface="+mn-lt"/>
           <a:ea typeface="+mn-ea"/>
           <a:cs typeface="+mn-cs"/>
         </a:defRPr>
       </a:lvl4pPr>
-      <a:lvl5pPr marL="2057400" indent="-228600" algn="l" defTabSz="914400" rtl="0" eaLnBrk="1" latinLnBrk="1" hangingPunct="1">
+      <a:lvl5pPr marL="2057400" indent="-182880" algn="l" defTabSz="914400" rtl="0" eaLnBrk="1" latinLnBrk="1" hangingPunct="1">
         <a:lnSpc>
           <a:spcPct val="90000"/>
         </a:lnSpc>
         <a:spcBef>
-          <a:spcPts val="500"/>
+          <a:spcPts val="250"/>
         </a:spcBef>
-        <a:buFont typeface="Arial" panose="020B0604020202020204" pitchFamily="34" charset="0"/>
-        <a:buChar char="•"/>
-        <a:defRPr sz="1800" kern="1200">
+        <a:spcAft>
+          <a:spcPts val="250"/>
+        </a:spcAft>
+        <a:buClr>
+          <a:schemeClr val="accent1"/>
+        </a:buClr>
+        <a:buFont typeface="Wingdings 2" pitchFamily="18" charset="2"/>
+        <a:buChar char=""/>
+        <a:defRPr sz="1400" kern="1200">
           <a:solidFill>
-            <a:schemeClr val="tx1"/>
+            <a:schemeClr val="tx1">
+              <a:lumMod val="75000"/>
+              <a:lumOff val="25000"/>
+            </a:schemeClr>
           </a:solidFill>
           <a:latin typeface="+mn-lt"/>
           <a:ea typeface="+mn-ea"/>
@@ -3254,13 +3642,22 @@
           <a:spcPct val="90000"/>
         </a:lnSpc>
         <a:spcBef>
-          <a:spcPts val="500"/>
+          <a:spcPts val="250"/>
         </a:spcBef>
-        <a:buFont typeface="Arial" panose="020B0604020202020204" pitchFamily="34" charset="0"/>
-        <a:buChar char="•"/>
-        <a:defRPr sz="1800" kern="1200">
+        <a:spcAft>
+          <a:spcPts val="250"/>
+        </a:spcAft>
+        <a:buClr>
+          <a:schemeClr val="accent1"/>
+        </a:buClr>
+        <a:buFont typeface="Wingdings 2" pitchFamily="18" charset="2"/>
+        <a:buChar char=""/>
+        <a:defRPr sz="1400" kern="1200">
           <a:solidFill>
-            <a:schemeClr val="tx1"/>
+            <a:schemeClr val="tx1">
+              <a:lumMod val="75000"/>
+              <a:lumOff val="25000"/>
+            </a:schemeClr>
           </a:solidFill>
           <a:latin typeface="+mn-lt"/>
           <a:ea typeface="+mn-ea"/>
@@ -3272,13 +3669,22 @@
           <a:spcPct val="90000"/>
         </a:lnSpc>
         <a:spcBef>
-          <a:spcPts val="500"/>
+          <a:spcPts val="250"/>
         </a:spcBef>
-        <a:buFont typeface="Arial" panose="020B0604020202020204" pitchFamily="34" charset="0"/>
-        <a:buChar char="•"/>
-        <a:defRPr sz="1800" kern="1200">
+        <a:spcAft>
+          <a:spcPts val="250"/>
+        </a:spcAft>
+        <a:buClr>
+          <a:schemeClr val="accent1"/>
+        </a:buClr>
+        <a:buFont typeface="Wingdings 2" pitchFamily="18" charset="2"/>
+        <a:buChar char=""/>
+        <a:defRPr sz="1400" kern="1200">
           <a:solidFill>
-            <a:schemeClr val="tx1"/>
+            <a:schemeClr val="tx1">
+              <a:lumMod val="75000"/>
+              <a:lumOff val="25000"/>
+            </a:schemeClr>
           </a:solidFill>
           <a:latin typeface="+mn-lt"/>
           <a:ea typeface="+mn-ea"/>
@@ -3290,13 +3696,22 @@
           <a:spcPct val="90000"/>
         </a:lnSpc>
         <a:spcBef>
-          <a:spcPts val="500"/>
+          <a:spcPts val="250"/>
         </a:spcBef>
-        <a:buFont typeface="Arial" panose="020B0604020202020204" pitchFamily="34" charset="0"/>
-        <a:buChar char="•"/>
-        <a:defRPr sz="1800" kern="1200">
+        <a:spcAft>
+          <a:spcPts val="250"/>
+        </a:spcAft>
+        <a:buClr>
+          <a:schemeClr val="accent1"/>
+        </a:buClr>
+        <a:buFont typeface="Wingdings 2" pitchFamily="18" charset="2"/>
+        <a:buChar char=""/>
+        <a:defRPr sz="1400" kern="1200">
           <a:solidFill>
-            <a:schemeClr val="tx1"/>
+            <a:schemeClr val="tx1">
+              <a:lumMod val="75000"/>
+              <a:lumOff val="25000"/>
+            </a:schemeClr>
           </a:solidFill>
           <a:latin typeface="+mn-lt"/>
           <a:ea typeface="+mn-ea"/>
@@ -3308,13 +3723,22 @@
           <a:spcPct val="90000"/>
         </a:lnSpc>
         <a:spcBef>
-          <a:spcPts val="500"/>
+          <a:spcPts val="250"/>
         </a:spcBef>
-        <a:buFont typeface="Arial" panose="020B0604020202020204" pitchFamily="34" charset="0"/>
-        <a:buChar char="•"/>
-        <a:defRPr sz="1800" kern="1200">
+        <a:spcAft>
+          <a:spcPts val="250"/>
+        </a:spcAft>
+        <a:buClr>
+          <a:schemeClr val="accent1"/>
+        </a:buClr>
+        <a:buFont typeface="Wingdings 2" pitchFamily="18" charset="2"/>
+        <a:buChar char=""/>
+        <a:defRPr sz="1400" kern="1200">
           <a:solidFill>
-            <a:schemeClr val="tx1"/>
+            <a:schemeClr val="tx1">
+              <a:lumMod val="75000"/>
+              <a:lumOff val="25000"/>
+            </a:schemeClr>
           </a:solidFill>
           <a:latin typeface="+mn-lt"/>
           <a:ea typeface="+mn-ea"/>
@@ -3324,7 +3748,7 @@
     </p:bodyStyle>
     <p:otherStyle>
       <a:defPPr>
-        <a:defRPr lang="ko-KR"/>
+        <a:defRPr lang="en-US"/>
       </a:defPPr>
       <a:lvl1pPr marL="0" algn="l" defTabSz="914400" rtl="0" eaLnBrk="1" latinLnBrk="1" hangingPunct="1">
         <a:defRPr sz="1800" kern="1200">
@@ -3424,6 +3848,20 @@
 <file path=ppt/slides/slide1.xml><?xml version="1.0" encoding="utf-8"?>
 <p:sld xmlns:a="http://schemas.openxmlformats.org/drawingml/2006/main" xmlns:r="http://schemas.openxmlformats.org/officeDocument/2006/relationships" xmlns:p="http://schemas.openxmlformats.org/presentationml/2006/main">
   <p:cSld>
+    <p:bg>
+      <p:bgPr>
+        <a:blipFill dpi="0" rotWithShape="1">
+          <a:blip r:embed="rId3">
+            <a:lum/>
+          </a:blip>
+          <a:srcRect/>
+          <a:stretch>
+            <a:fillRect l="-4000" r="-4000"/>
+          </a:stretch>
+        </a:blipFill>
+        <a:effectLst/>
+      </p:bgPr>
+    </p:bg>
     <p:spTree>
       <p:nvGrpSpPr>
         <p:cNvPr id="1" name=""/>
@@ -3440,41 +3878,66 @@
       </p:grpSpPr>
       <p:sp>
         <p:nvSpPr>
-          <p:cNvPr id="2" name="Title 1"/>
-          <p:cNvSpPr>
-            <a:spLocks noGrp="1"/>
-          </p:cNvSpPr>
-          <p:nvPr>
-            <p:ph type="ctrTitle"/>
-          </p:nvPr>
-        </p:nvSpPr>
-        <p:spPr/>
-        <p:txBody>
-          <a:bodyPr/>
-          <a:lstStyle/>
-          <a:p>
-            <a:r>
-              <a:rPr lang="en-US" altLang="ko-KR" dirty="0" err="1" smtClean="0"/>
-              <a:t>iSecure</a:t>
-            </a:r>
-            <a:endParaRPr lang="ko-KR" altLang="en-US" dirty="0"/>
-          </a:p>
-        </p:txBody>
-      </p:sp>
-      <p:sp>
-        <p:nvSpPr>
-          <p:cNvPr id="3" name="Subtitle 2"/>
-          <p:cNvSpPr>
-            <a:spLocks noGrp="1"/>
-          </p:cNvSpPr>
-          <p:nvPr>
-            <p:ph type="subTitle" idx="1"/>
-          </p:nvPr>
+          <p:cNvPr id="8" name="Rectangle 7"/>
+          <p:cNvSpPr/>
+          <p:nvPr/>
         </p:nvSpPr>
         <p:spPr>
           <a:xfrm>
-            <a:off x="1524000" y="3602037"/>
-            <a:ext cx="9144000" cy="2598465"/>
+            <a:off x="0" y="4587240"/>
+            <a:ext cx="12192000" cy="1998345"/>
+          </a:xfrm>
+          <a:prstGeom prst="rect">
+            <a:avLst/>
+          </a:prstGeom>
+          <a:solidFill>
+            <a:schemeClr val="accent1">
+              <a:alpha val="70000"/>
+            </a:schemeClr>
+          </a:solidFill>
+          <a:ln>
+            <a:noFill/>
+          </a:ln>
+        </p:spPr>
+        <p:style>
+          <a:lnRef idx="2">
+            <a:schemeClr val="accent1">
+              <a:shade val="50000"/>
+            </a:schemeClr>
+          </a:lnRef>
+          <a:fillRef idx="1">
+            <a:schemeClr val="accent1"/>
+          </a:fillRef>
+          <a:effectRef idx="0">
+            <a:schemeClr val="accent1"/>
+          </a:effectRef>
+          <a:fontRef idx="minor">
+            <a:schemeClr val="lt1"/>
+          </a:fontRef>
+        </p:style>
+        <p:txBody>
+          <a:bodyPr rtlCol="0" anchor="ctr"/>
+          <a:lstStyle/>
+          <a:p>
+            <a:pPr algn="ctr"/>
+            <a:endParaRPr lang="ko-KR" altLang="en-US"/>
+          </a:p>
+        </p:txBody>
+      </p:sp>
+      <p:sp>
+        <p:nvSpPr>
+          <p:cNvPr id="2" name="Title 1"/>
+          <p:cNvSpPr>
+            <a:spLocks noGrp="1"/>
+          </p:cNvSpPr>
+          <p:nvPr>
+            <p:ph type="ctrTitle" idx="4294967295"/>
+          </p:nvPr>
+        </p:nvSpPr>
+        <p:spPr>
+          <a:xfrm>
+            <a:off x="167640" y="4197985"/>
+            <a:ext cx="9144000" cy="2387600"/>
           </a:xfrm>
         </p:spPr>
         <p:txBody>
@@ -3484,15 +3947,161 @@
           <a:lstStyle/>
           <a:p>
             <a:r>
-              <a:rPr lang="en-US" altLang="ko-KR" dirty="0" smtClean="0"/>
-              <a:t>Home security solution </a:t>
-            </a:r>
-            <a:r>
-              <a:rPr lang="en-US" altLang="ko-KR" dirty="0"/>
-              <a:t>when you are away</a:t>
-            </a:r>
-            <a:endParaRPr lang="ko-KR" altLang="en-US" dirty="0"/>
-          </a:p>
+              <a:rPr lang="en-US" altLang="ko-KR" sz="6500" b="1" dirty="0" err="1" smtClean="0">
+                <a:solidFill>
+                  <a:schemeClr val="tx1">
+                    <a:lumMod val="90000"/>
+                    <a:lumOff val="10000"/>
+                  </a:schemeClr>
+                </a:solidFill>
+              </a:rPr>
+              <a:t>i</a:t>
+            </a:r>
+            <a:r>
+              <a:rPr lang="en-US" altLang="ko-KR" sz="6500" b="1" dirty="0" err="1" smtClean="0">
+                <a:solidFill>
+                  <a:schemeClr val="bg1"/>
+                </a:solidFill>
+              </a:rPr>
+              <a:t>Secure</a:t>
+            </a:r>
+            <a:endParaRPr lang="ko-KR" altLang="en-US" sz="6500" b="1" dirty="0">
+              <a:solidFill>
+                <a:schemeClr val="bg1"/>
+              </a:solidFill>
+            </a:endParaRPr>
+          </a:p>
+        </p:txBody>
+      </p:sp>
+      <p:sp>
+        <p:nvSpPr>
+          <p:cNvPr id="3" name="Subtitle 2"/>
+          <p:cNvSpPr>
+            <a:spLocks noGrp="1"/>
+          </p:cNvSpPr>
+          <p:nvPr>
+            <p:ph type="subTitle" idx="4294967295"/>
+          </p:nvPr>
+        </p:nvSpPr>
+        <p:spPr>
+          <a:xfrm>
+            <a:off x="152400" y="4982864"/>
+            <a:ext cx="9144000" cy="2597150"/>
+          </a:xfrm>
+        </p:spPr>
+        <p:txBody>
+          <a:bodyPr>
+            <a:normAutofit/>
+          </a:bodyPr>
+          <a:lstStyle/>
+          <a:p>
+            <a:pPr marL="0" indent="0">
+              <a:buNone/>
+            </a:pPr>
+            <a:r>
+              <a:rPr lang="en-US" altLang="ko-KR" sz="2800" dirty="0" smtClean="0">
+                <a:solidFill>
+                  <a:schemeClr val="tx1">
+                    <a:lumMod val="90000"/>
+                    <a:lumOff val="10000"/>
+                  </a:schemeClr>
+                </a:solidFill>
+              </a:rPr>
+              <a:t>Home security solution when you </a:t>
+            </a:r>
+            <a:r>
+              <a:rPr lang="en-US" altLang="ko-KR" sz="2800" dirty="0" smtClean="0">
+                <a:solidFill>
+                  <a:schemeClr val="tx1">
+                    <a:lumMod val="90000"/>
+                    <a:lumOff val="10000"/>
+                  </a:schemeClr>
+                </a:solidFill>
+              </a:rPr>
+              <a:t>are a</a:t>
+            </a:r>
+            <a:r>
+              <a:rPr lang="en-US" altLang="ko-KR" sz="2800" dirty="0" smtClean="0">
+                <a:solidFill>
+                  <a:schemeClr val="tx1">
+                    <a:lumMod val="90000"/>
+                    <a:lumOff val="10000"/>
+                  </a:schemeClr>
+                </a:solidFill>
+              </a:rPr>
+              <a:t>way</a:t>
+            </a:r>
+            <a:endParaRPr lang="ko-KR" altLang="en-US" sz="2800" dirty="0" smtClean="0">
+              <a:solidFill>
+                <a:schemeClr val="tx1">
+                  <a:lumMod val="90000"/>
+                  <a:lumOff val="10000"/>
+                </a:schemeClr>
+              </a:solidFill>
+            </a:endParaRPr>
+          </a:p>
+          <a:p>
+            <a:endParaRPr lang="ko-KR" altLang="en-US" sz="2800" dirty="0">
+              <a:solidFill>
+                <a:schemeClr val="bg1">
+                  <a:lumMod val="95000"/>
+                </a:schemeClr>
+              </a:solidFill>
+            </a:endParaRPr>
+          </a:p>
+        </p:txBody>
+      </p:sp>
+      <p:pic>
+        <p:nvPicPr>
+          <p:cNvPr id="5" name="Picture 4"/>
+          <p:cNvPicPr>
+            <a:picLocks noChangeAspect="1"/>
+          </p:cNvPicPr>
+          <p:nvPr/>
+        </p:nvPicPr>
+        <p:blipFill>
+          <a:blip r:embed="rId4">
+            <a:extLst>
+              <a:ext uri="{28A0092B-C50C-407E-A947-70E740481C1C}">
+                <a14:useLocalDpi xmlns:a14="http://schemas.microsoft.com/office/drawing/2010/main" val="0"/>
+              </a:ext>
+            </a:extLst>
+          </a:blip>
+          <a:stretch>
+            <a:fillRect/>
+          </a:stretch>
+        </p:blipFill>
+        <p:spPr>
+          <a:xfrm>
+            <a:off x="8121968" y="1021080"/>
+            <a:ext cx="1726504" cy="1590021"/>
+          </a:xfrm>
+          <a:prstGeom prst="rect">
+            <a:avLst/>
+          </a:prstGeom>
+        </p:spPr>
+      </p:pic>
+      <p:sp>
+        <p:nvSpPr>
+          <p:cNvPr id="6" name="TextBox 5"/>
+          <p:cNvSpPr txBox="1"/>
+          <p:nvPr/>
+        </p:nvSpPr>
+        <p:spPr>
+          <a:xfrm>
+            <a:off x="1021080" y="762000"/>
+            <a:ext cx="3550920" cy="1173480"/>
+          </a:xfrm>
+          <a:prstGeom prst="rect">
+            <a:avLst/>
+          </a:prstGeom>
+          <a:noFill/>
+        </p:spPr>
+        <p:txBody>
+          <a:bodyPr wrap="square" rtlCol="0">
+            <a:spAutoFit/>
+          </a:bodyPr>
+          <a:lstStyle/>
           <a:p>
             <a:endParaRPr lang="ko-KR" altLang="en-US" dirty="0"/>
           </a:p>
@@ -3508,6 +4117,13 @@
   <p:clrMapOvr>
     <a:masterClrMapping/>
   </p:clrMapOvr>
+  <p:timing>
+    <p:tnLst>
+      <p:par>
+        <p:cTn id="1" dur="indefinite" restart="never" nodeType="tmRoot"/>
+      </p:par>
+    </p:tnLst>
+  </p:timing>
 </p:sld>
 </file>
 
@@ -3588,34 +4204,40 @@
             </a:r>
           </a:p>
           <a:p>
-            <a:pPr marL="914400" lvl="1" indent="-457200">
-              <a:buFont typeface="+mj-lt"/>
-              <a:buAutoNum type="arabicPeriod"/>
+            <a:pPr marL="742950" lvl="1" indent="-285750"/>
+            <a:r>
+              <a:rPr lang="en-US" altLang="ko-KR" dirty="0" smtClean="0"/>
+              <a:t>Intruder </a:t>
+            </a:r>
+            <a:r>
+              <a:rPr lang="en-US" altLang="ko-KR" dirty="0" smtClean="0"/>
+              <a:t>Detection</a:t>
+            </a:r>
+          </a:p>
+          <a:p>
+            <a:pPr marL="914400" lvl="2" indent="0">
+              <a:buNone/>
             </a:pPr>
             <a:r>
               <a:rPr lang="en-US" altLang="ko-KR" dirty="0" smtClean="0"/>
-              <a:t>Intruder Detection</a:t>
-            </a:r>
-          </a:p>
-          <a:p>
-            <a:pPr lvl="2"/>
+              <a:t>Notify </a:t>
+            </a:r>
             <a:r>
               <a:rPr lang="en-US" altLang="ko-KR" dirty="0" smtClean="0"/>
-              <a:t>Notify users when there is an intruder in their empty houses</a:t>
-            </a:r>
-          </a:p>
-          <a:p>
-            <a:pPr marL="914400" lvl="1" indent="-457200">
-              <a:buFont typeface="+mj-lt"/>
-              <a:buAutoNum type="arabicPeriod"/>
-            </a:pPr>
+              <a:t>users when there is an intruder in their empty houses</a:t>
+            </a:r>
+          </a:p>
+          <a:p>
+            <a:pPr marL="742950" lvl="1" indent="-285750"/>
             <a:r>
               <a:rPr lang="en-US" altLang="ko-KR" dirty="0"/>
               <a:t>Fire Detection</a:t>
             </a:r>
           </a:p>
           <a:p>
-            <a:pPr lvl="2"/>
+            <a:pPr marL="960120" lvl="2" indent="0">
+              <a:buNone/>
+            </a:pPr>
             <a:r>
               <a:rPr lang="en-US" altLang="ko-KR" dirty="0"/>
               <a:t>Notify users </a:t>
@@ -3634,27 +4256,23 @@
             </a:r>
           </a:p>
           <a:p>
-            <a:pPr marL="914400" lvl="1" indent="-457200">
-              <a:buFont typeface="+mj-lt"/>
-              <a:buAutoNum type="arabicPeriod"/>
-            </a:pPr>
+            <a:pPr marL="742950" lvl="1" indent="-285750"/>
             <a:r>
               <a:rPr lang="en-US" altLang="ko-KR" dirty="0" smtClean="0"/>
               <a:t>Lamp Detection</a:t>
             </a:r>
           </a:p>
           <a:p>
-            <a:pPr lvl="2"/>
+            <a:pPr marL="960120" lvl="2" indent="0">
+              <a:buNone/>
+            </a:pPr>
             <a:r>
               <a:rPr lang="en-US" altLang="ko-KR" dirty="0" smtClean="0"/>
               <a:t>Notify users if they forget to turn off the light when they are away</a:t>
             </a:r>
           </a:p>
           <a:p>
-            <a:pPr marL="914400" lvl="1" indent="-457200">
-              <a:buFont typeface="+mj-lt"/>
-              <a:buAutoNum type="arabicPeriod"/>
-            </a:pPr>
+            <a:pPr marL="742950" lvl="1" indent="-285750"/>
             <a:r>
               <a:rPr lang="en-US" altLang="ko-KR" dirty="0" smtClean="0"/>
               <a:t>Real-Time </a:t>
@@ -3669,7 +4287,9 @@
             </a:r>
           </a:p>
           <a:p>
-            <a:pPr lvl="2"/>
+            <a:pPr marL="960120" lvl="2" indent="0">
+              <a:buNone/>
+            </a:pPr>
             <a:r>
               <a:rPr lang="en-US" altLang="ko-KR" dirty="0" smtClean="0"/>
               <a:t>Give a real-time home picturing information</a:t>
@@ -3708,6 +4328,13 @@
   <p:clrMapOvr>
     <a:masterClrMapping/>
   </p:clrMapOvr>
+  <p:timing>
+    <p:tnLst>
+      <p:par>
+        <p:cTn id="1" dur="indefinite" restart="never" nodeType="tmRoot"/>
+      </p:par>
+    </p:tnLst>
+  </p:timing>
 </p:sld>
 </file>
 
@@ -3766,19 +4393,16 @@
           <a:bodyPr/>
           <a:lstStyle/>
           <a:p>
-            <a:pPr marL="514350" indent="-514350">
-              <a:buAutoNum type="arabicPeriod"/>
-            </a:pPr>
-            <a:r>
-              <a:rPr lang="en-US" altLang="ko-KR" dirty="0" smtClean="0"/>
+            <a:r>
+              <a:rPr lang="en-US" altLang="ko-KR" sz="2400" dirty="0" smtClean="0"/>
               <a:t>Passive </a:t>
             </a:r>
             <a:r>
-              <a:rPr lang="en-US" altLang="ko-KR" dirty="0" err="1" smtClean="0"/>
+              <a:rPr lang="en-US" altLang="ko-KR" sz="2400" dirty="0" err="1" smtClean="0"/>
               <a:t>InfraRed</a:t>
             </a:r>
             <a:r>
-              <a:rPr lang="en-US" altLang="ko-KR" dirty="0" smtClean="0"/>
+              <a:rPr lang="en-US" altLang="ko-KR" sz="2400" dirty="0" smtClean="0"/>
               <a:t> (PIR)</a:t>
             </a:r>
           </a:p>
@@ -3790,31 +4414,33 @@
               <a:rPr lang="en-US" altLang="ko-KR" dirty="0" smtClean="0">
                 <a:sym typeface="Wingdings" panose="05000000000000000000" pitchFamily="2" charset="2"/>
               </a:rPr>
-              <a:t>	</a:t>
-            </a:r>
-            <a:r>
-              <a:rPr lang="en-US" altLang="ko-KR" sz="2400" dirty="0" smtClean="0">
+              <a:t>	Detect motion of human being (</a:t>
+            </a:r>
+            <a:r>
+              <a:rPr lang="en-US" altLang="ko-KR" dirty="0" smtClean="0">
                 <a:sym typeface="Wingdings" panose="05000000000000000000" pitchFamily="2" charset="2"/>
               </a:rPr>
-              <a:t>Detect motion of human being (intruder)</a:t>
-            </a:r>
-            <a:endParaRPr lang="en-US" altLang="ko-KR" sz="2400" dirty="0"/>
-          </a:p>
-          <a:p>
-            <a:pPr marL="514350" indent="-514350">
-              <a:buAutoNum type="arabicPeriod" startAt="2"/>
-            </a:pPr>
-            <a:r>
-              <a:rPr lang="en-US" altLang="ko-KR" dirty="0" err="1" smtClean="0"/>
+              <a:t>intruder)</a:t>
+            </a:r>
+            <a:endParaRPr lang="en-US" altLang="ko-KR" dirty="0">
+              <a:sym typeface="Wingdings" panose="05000000000000000000" pitchFamily="2" charset="2"/>
+            </a:endParaRPr>
+          </a:p>
+          <a:p>
+            <a:r>
+              <a:rPr lang="en-US" altLang="ko-KR" sz="2400" dirty="0" err="1"/>
               <a:t>InfraRed</a:t>
             </a:r>
             <a:r>
-              <a:rPr lang="en-US" altLang="ko-KR" dirty="0" smtClean="0"/>
+              <a:rPr lang="en-US" altLang="ko-KR" sz="2400" dirty="0"/>
               <a:t> (IR)</a:t>
             </a:r>
           </a:p>
           <a:p>
-            <a:pPr marL="457200" lvl="1" indent="0">
+            <a:pPr marL="0" lvl="1" indent="0">
+              <a:spcBef>
+                <a:spcPts val="1200"/>
+              </a:spcBef>
               <a:buNone/>
             </a:pPr>
             <a:r>
@@ -3822,26 +4448,22 @@
               <a:t>	</a:t>
             </a:r>
             <a:r>
-              <a:rPr lang="en-US" altLang="ko-KR" dirty="0" smtClean="0"/>
+              <a:rPr lang="en-US" altLang="ko-KR" sz="2000" dirty="0"/>
               <a:t>Detect lamp state (on/off)</a:t>
             </a:r>
-            <a:endParaRPr lang="en-US" altLang="ko-KR" dirty="0"/>
-          </a:p>
-          <a:p>
-            <a:pPr marL="0" indent="0">
-              <a:buNone/>
-            </a:pPr>
-            <a:r>
-              <a:rPr lang="en-US" altLang="ko-KR" dirty="0"/>
-              <a:t>3. </a:t>
-            </a:r>
-            <a:r>
-              <a:rPr lang="en-US" altLang="ko-KR" dirty="0" smtClean="0"/>
+            <a:endParaRPr lang="en-US" altLang="ko-KR" sz="2000" dirty="0"/>
+          </a:p>
+          <a:p>
+            <a:r>
+              <a:rPr lang="en-US" altLang="ko-KR" sz="2400" dirty="0"/>
               <a:t>Camera</a:t>
             </a:r>
           </a:p>
           <a:p>
-            <a:pPr marL="0" indent="0">
+            <a:pPr marL="0" lvl="1" indent="0">
+              <a:spcBef>
+                <a:spcPts val="1200"/>
+              </a:spcBef>
               <a:buNone/>
             </a:pPr>
             <a:r>
@@ -3849,30 +4471,21 @@
               <a:t>	</a:t>
             </a:r>
             <a:r>
-              <a:rPr lang="en-US" altLang="ko-KR" sz="2400" dirty="0" smtClean="0"/>
+              <a:rPr lang="en-US" altLang="ko-KR" sz="2000" dirty="0"/>
               <a:t>Capture images of house condition</a:t>
             </a:r>
-            <a:endParaRPr lang="en-US" altLang="ko-KR" dirty="0" smtClean="0"/>
-          </a:p>
-          <a:p>
-            <a:pPr marL="0" indent="0">
-              <a:buNone/>
-            </a:pPr>
-            <a:r>
-              <a:rPr lang="en-US" altLang="ko-KR" dirty="0" smtClean="0"/>
-              <a:t>4</a:t>
-            </a:r>
-            <a:r>
-              <a:rPr lang="en-US" altLang="ko-KR" dirty="0"/>
-              <a:t>. </a:t>
-            </a:r>
-            <a:r>
-              <a:rPr lang="en-US" altLang="ko-KR" dirty="0" smtClean="0"/>
+          </a:p>
+          <a:p>
+            <a:r>
+              <a:rPr lang="en-US" altLang="ko-KR" sz="2400" dirty="0"/>
               <a:t>Temperature</a:t>
             </a:r>
           </a:p>
           <a:p>
-            <a:pPr marL="0" indent="0">
+            <a:pPr marL="0" lvl="1" indent="0">
+              <a:spcBef>
+                <a:spcPts val="1200"/>
+              </a:spcBef>
               <a:buNone/>
             </a:pPr>
             <a:r>
@@ -3880,10 +4493,10 @@
               <a:t>	</a:t>
             </a:r>
             <a:r>
-              <a:rPr lang="en-US" altLang="ko-KR" sz="2400" dirty="0" smtClean="0"/>
+              <a:rPr lang="en-US" altLang="ko-KR" sz="2000" dirty="0"/>
               <a:t>Sense the presence of fire based on temperature value</a:t>
             </a:r>
-            <a:endParaRPr lang="en-US" altLang="ko-KR" dirty="0"/>
+            <a:endParaRPr lang="en-US" altLang="ko-KR" sz="2000" dirty="0"/>
           </a:p>
           <a:p>
             <a:pPr marL="0" indent="0">
@@ -3903,6 +4516,13 @@
   <p:clrMapOvr>
     <a:masterClrMapping/>
   </p:clrMapOvr>
+  <p:timing>
+    <p:tnLst>
+      <p:par>
+        <p:cTn id="1" dur="indefinite" restart="never" nodeType="tmRoot"/>
+      </p:par>
+    </p:tnLst>
+  </p:timing>
 </p:sld>
 </file>
 
@@ -3935,37 +4555,39 @@
         </p:nvSpPr>
         <p:spPr/>
         <p:txBody>
+          <a:bodyPr>
+            <a:normAutofit/>
+          </a:bodyPr>
+          <a:lstStyle/>
+          <a:p>
+            <a:r>
+              <a:rPr lang="en-US" altLang="ko-KR" sz="3200" dirty="0" smtClean="0"/>
+              <a:t>Communication Interface</a:t>
+            </a:r>
+            <a:endParaRPr lang="ko-KR" altLang="en-US" sz="3200" dirty="0"/>
+          </a:p>
+        </p:txBody>
+      </p:sp>
+      <p:sp>
+        <p:nvSpPr>
+          <p:cNvPr id="3" name="Content Placeholder 2"/>
+          <p:cNvSpPr>
+            <a:spLocks noGrp="1"/>
+          </p:cNvSpPr>
+          <p:nvPr>
+            <p:ph idx="1"/>
+          </p:nvPr>
+        </p:nvSpPr>
+        <p:spPr/>
+        <p:txBody>
           <a:bodyPr/>
           <a:lstStyle/>
           <a:p>
-            <a:r>
-              <a:rPr lang="en-US" altLang="ko-KR" dirty="0" smtClean="0"/>
-              <a:t>Communication Interface</a:t>
-            </a:r>
-            <a:endParaRPr lang="ko-KR" altLang="en-US" dirty="0"/>
-          </a:p>
-        </p:txBody>
-      </p:sp>
-      <p:sp>
-        <p:nvSpPr>
-          <p:cNvPr id="3" name="Content Placeholder 2"/>
-          <p:cNvSpPr>
-            <a:spLocks noGrp="1"/>
-          </p:cNvSpPr>
-          <p:nvPr>
-            <p:ph idx="1"/>
-          </p:nvPr>
-        </p:nvSpPr>
-        <p:spPr/>
-        <p:txBody>
-          <a:bodyPr/>
-          <a:lstStyle/>
-          <a:p>
             <a:pPr marL="0" indent="0">
               <a:buNone/>
             </a:pPr>
             <a:r>
-              <a:rPr lang="en-US" altLang="ko-KR" dirty="0" smtClean="0"/>
+              <a:rPr lang="en-US" altLang="ko-KR" sz="2400" dirty="0" smtClean="0"/>
               <a:t>Wi-Fi Connection</a:t>
             </a:r>
           </a:p>
@@ -4027,6 +4649,13 @@
   <p:clrMapOvr>
     <a:masterClrMapping/>
   </p:clrMapOvr>
+  <p:timing>
+    <p:tnLst>
+      <p:par>
+        <p:cTn id="1" dur="indefinite" restart="never" nodeType="tmRoot"/>
+      </p:par>
+    </p:tnLst>
+  </p:timing>
 </p:sld>
 </file>
 
@@ -4069,7 +4698,7 @@
         </p:blipFill>
         <p:spPr>
           <a:xfrm>
-            <a:off x="8474056" y="2955235"/>
+            <a:off x="9082733" y="4204915"/>
             <a:ext cx="2402952" cy="1752153"/>
           </a:xfrm>
           <a:prstGeom prst="rect">
@@ -4124,7 +4753,7 @@
         </p:blipFill>
         <p:spPr>
           <a:xfrm>
-            <a:off x="1699944" y="3180668"/>
+            <a:off x="3681144" y="2205308"/>
             <a:ext cx="1247869" cy="942508"/>
           </a:xfrm>
         </p:spPr>
@@ -4151,7 +4780,7 @@
         </p:blipFill>
         <p:spPr>
           <a:xfrm>
-            <a:off x="3612962" y="5544391"/>
+            <a:off x="5594162" y="4569031"/>
             <a:ext cx="1094810" cy="673529"/>
           </a:xfrm>
           <a:prstGeom prst="rect">
@@ -4181,7 +4810,7 @@
         </p:blipFill>
         <p:spPr>
           <a:xfrm>
-            <a:off x="3063786" y="2885706"/>
+            <a:off x="5044986" y="1910346"/>
             <a:ext cx="3737612" cy="2485658"/>
           </a:xfrm>
           <a:prstGeom prst="rect">
@@ -4211,7 +4840,7 @@
         </p:blipFill>
         <p:spPr>
           <a:xfrm>
-            <a:off x="2947813" y="1675063"/>
+            <a:off x="4929013" y="699703"/>
             <a:ext cx="1003150" cy="1003150"/>
           </a:xfrm>
           <a:prstGeom prst="rect">
@@ -4241,7 +4870,7 @@
         </p:blipFill>
         <p:spPr>
           <a:xfrm>
-            <a:off x="1924353" y="4682214"/>
+            <a:off x="3905553" y="3706854"/>
             <a:ext cx="1221005" cy="1221005"/>
           </a:xfrm>
           <a:prstGeom prst="rect">
@@ -4271,7 +4900,7 @@
         </p:blipFill>
         <p:spPr>
           <a:xfrm>
-            <a:off x="7565100" y="3278547"/>
+            <a:off x="9069828" y="3671710"/>
             <a:ext cx="571537" cy="413498"/>
           </a:xfrm>
           <a:prstGeom prst="rect">
@@ -4287,10 +4916,10 @@
         </p:nvGrpSpPr>
         <p:grpSpPr>
           <a:xfrm>
-            <a:off x="3037926" y="2548379"/>
-            <a:ext cx="5757734" cy="3037433"/>
+            <a:off x="5019126" y="1573019"/>
+            <a:ext cx="4682315" cy="3037433"/>
             <a:chOff x="1984186" y="2548379"/>
-            <a:chExt cx="5757734" cy="3037433"/>
+            <a:chExt cx="4682315" cy="3037433"/>
           </a:xfrm>
         </p:grpSpPr>
         <p:cxnSp>
@@ -4301,8 +4930,8 @@
           </p:nvCxnSpPr>
           <p:spPr>
             <a:xfrm>
-              <a:off x="6008914" y="3831311"/>
-              <a:ext cx="1733006" cy="0"/>
+              <a:off x="5592518" y="4737449"/>
+              <a:ext cx="1073983" cy="806942"/>
             </a:xfrm>
             <a:prstGeom prst="straightConnector1">
               <a:avLst/>
@@ -4474,97 +5103,69 @@
   <p:clrMapOvr>
     <a:masterClrMapping/>
   </p:clrMapOvr>
+  <p:timing>
+    <p:tnLst>
+      <p:par>
+        <p:cTn id="1" dur="indefinite" restart="never" nodeType="tmRoot"/>
+      </p:par>
+    </p:tnLst>
+  </p:timing>
 </p:sld>
 </file>
 
 <file path=ppt/theme/theme1.xml><?xml version="1.0" encoding="utf-8"?>
-<a:theme xmlns:a="http://schemas.openxmlformats.org/drawingml/2006/main" name="Office Theme">
+<a:theme xmlns:a="http://schemas.openxmlformats.org/drawingml/2006/main" name="Frame">
   <a:themeElements>
-    <a:clrScheme name="Office">
+    <a:clrScheme name="Custom 1">
       <a:dk1>
-        <a:sysClr val="windowText" lastClr="000000"/>
+        <a:srgbClr val="2F2B20"/>
       </a:dk1>
       <a:lt1>
-        <a:sysClr val="window" lastClr="FFFFFF"/>
+        <a:srgbClr val="FFFFFF"/>
       </a:lt1>
       <a:dk2>
-        <a:srgbClr val="44546A"/>
+        <a:srgbClr val="675E47"/>
       </a:dk2>
       <a:lt2>
-        <a:srgbClr val="E7E6E6"/>
+        <a:srgbClr val="ACA287"/>
       </a:lt2>
       <a:accent1>
-        <a:srgbClr val="5B9BD5"/>
+        <a:srgbClr val="A9A57C"/>
       </a:accent1>
       <a:accent2>
-        <a:srgbClr val="ED7D31"/>
+        <a:srgbClr val="9CBEBD"/>
       </a:accent2>
       <a:accent3>
-        <a:srgbClr val="A5A5A5"/>
+        <a:srgbClr val="D2CB6C"/>
       </a:accent3>
       <a:accent4>
-        <a:srgbClr val="FFC000"/>
+        <a:srgbClr val="95A39D"/>
       </a:accent4>
       <a:accent5>
-        <a:srgbClr val="4472C4"/>
+        <a:srgbClr val="C89F5D"/>
       </a:accent5>
       <a:accent6>
-        <a:srgbClr val="70AD47"/>
+        <a:srgbClr val="B1A089"/>
       </a:accent6>
       <a:hlink>
-        <a:srgbClr val="0563C1"/>
+        <a:srgbClr val="D25814"/>
       </a:hlink>
       <a:folHlink>
-        <a:srgbClr val="954F72"/>
+        <a:srgbClr val="849A0A"/>
       </a:folHlink>
     </a:clrScheme>
-    <a:fontScheme name="Office">
+    <a:fontScheme name="Frame">
       <a:majorFont>
-        <a:latin typeface="맑은 고딕" panose="020F0302020204030204"/>
+        <a:latin typeface="Corbel" panose="020B0503020204020204"/>
         <a:ea typeface=""/>
         <a:cs typeface=""/>
-        <a:font script="Jpan" typeface="游ゴシック Light"/>
-        <a:font script="Hang" typeface="맑은 고딕"/>
-        <a:font script="Hans" typeface="等线 Light"/>
-        <a:font script="Hant" typeface="新細明體"/>
-        <a:font script="Arab" typeface="Times New Roman"/>
-        <a:font script="Hebr" typeface="Times New Roman"/>
-        <a:font script="Thai" typeface="Angsana New"/>
-        <a:font script="Ethi" typeface="Nyala"/>
-        <a:font script="Beng" typeface="Vrinda"/>
-        <a:font script="Gujr" typeface="Shruti"/>
-        <a:font script="Khmr" typeface="MoolBoran"/>
-        <a:font script="Knda" typeface="Tunga"/>
-        <a:font script="Guru" typeface="Raavi"/>
-        <a:font script="Cans" typeface="Euphemia"/>
-        <a:font script="Cher" typeface="Plantagenet Cherokee"/>
-        <a:font script="Yiii" typeface="Microsoft Yi Baiti"/>
-        <a:font script="Tibt" typeface="Microsoft Himalaya"/>
-        <a:font script="Thaa" typeface="MV Boli"/>
-        <a:font script="Deva" typeface="Mangal"/>
-        <a:font script="Telu" typeface="Gautami"/>
-        <a:font script="Taml" typeface="Latha"/>
-        <a:font script="Syrc" typeface="Estrangelo Edessa"/>
-        <a:font script="Orya" typeface="Kalinga"/>
-        <a:font script="Mlym" typeface="Kartika"/>
-        <a:font script="Laoo" typeface="DokChampa"/>
-        <a:font script="Sinh" typeface="Iskoola Pota"/>
-        <a:font script="Mong" typeface="Mongolian Baiti"/>
-        <a:font script="Viet" typeface="Times New Roman"/>
-        <a:font script="Uigh" typeface="Microsoft Uighur"/>
-        <a:font script="Geor" typeface="Sylfaen"/>
-      </a:majorFont>
-      <a:minorFont>
-        <a:latin typeface="맑은 고딕" panose="020F0502020204030204"/>
-        <a:ea typeface=""/>
-        <a:cs typeface=""/>
-        <a:font script="Jpan" typeface="游ゴシック"/>
-        <a:font script="Hang" typeface="맑은 고딕"/>
-        <a:font script="Hans" typeface="等线"/>
-        <a:font script="Hant" typeface="新細明體"/>
-        <a:font script="Arab" typeface="Arial"/>
-        <a:font script="Hebr" typeface="Arial"/>
-        <a:font script="Thai" typeface="Cordia New"/>
+        <a:font script="Jpan" typeface="ＭＳ ゴシック"/>
+        <a:font script="Hang" typeface="HY중고딕"/>
+        <a:font script="Hans" typeface="幼圆"/>
+        <a:font script="Hant" typeface="微軟正黑體"/>
+        <a:font script="Arab" typeface="Tahoma"/>
+        <a:font script="Hebr" typeface="Gisha"/>
+        <a:font script="Thai" typeface="DilleniaUPC"/>
         <a:font script="Ethi" typeface="Nyala"/>
         <a:font script="Beng" typeface="Vrinda"/>
         <a:font script="Gujr" typeface="Shruti"/>
@@ -4585,90 +5186,85 @@
         <a:font script="Laoo" typeface="DokChampa"/>
         <a:font script="Sinh" typeface="Iskoola Pota"/>
         <a:font script="Mong" typeface="Mongolian Baiti"/>
-        <a:font script="Viet" typeface="Arial"/>
+        <a:font script="Viet" typeface="Tahoma"/>
+        <a:font script="Uigh" typeface="Microsoft Uighur"/>
+        <a:font script="Geor" typeface="Sylfaen"/>
+      </a:majorFont>
+      <a:minorFont>
+        <a:latin typeface="Corbel" panose="020B0503020204020204"/>
+        <a:ea typeface=""/>
+        <a:cs typeface=""/>
+        <a:font script="Jpan" typeface="ＭＳ ゴシック"/>
+        <a:font script="Hang" typeface="HY중고딕"/>
+        <a:font script="Hans" typeface="幼圆"/>
+        <a:font script="Hant" typeface="微軟正黑體"/>
+        <a:font script="Arab" typeface="Tahoma"/>
+        <a:font script="Hebr" typeface="Gisha"/>
+        <a:font script="Thai" typeface="DilleniaUPC"/>
+        <a:font script="Ethi" typeface="Nyala"/>
+        <a:font script="Beng" typeface="Vrinda"/>
+        <a:font script="Gujr" typeface="Shruti"/>
+        <a:font script="Khmr" typeface="DaunPenh"/>
+        <a:font script="Knda" typeface="Tunga"/>
+        <a:font script="Guru" typeface="Raavi"/>
+        <a:font script="Cans" typeface="Euphemia"/>
+        <a:font script="Cher" typeface="Plantagenet Cherokee"/>
+        <a:font script="Yiii" typeface="Microsoft Yi Baiti"/>
+        <a:font script="Tibt" typeface="Microsoft Himalaya"/>
+        <a:font script="Thaa" typeface="MV Boli"/>
+        <a:font script="Deva" typeface="Mangal"/>
+        <a:font script="Telu" typeface="Gautami"/>
+        <a:font script="Taml" typeface="Latha"/>
+        <a:font script="Syrc" typeface="Estrangelo Edessa"/>
+        <a:font script="Orya" typeface="Kalinga"/>
+        <a:font script="Mlym" typeface="Kartika"/>
+        <a:font script="Laoo" typeface="DokChampa"/>
+        <a:font script="Sinh" typeface="Iskoola Pota"/>
+        <a:font script="Mong" typeface="Mongolian Baiti"/>
+        <a:font script="Viet" typeface="Verdana"/>
         <a:font script="Uigh" typeface="Microsoft Uighur"/>
         <a:font script="Geor" typeface="Sylfaen"/>
       </a:minorFont>
     </a:fontScheme>
-    <a:fmtScheme name="Office">
+    <a:fmtScheme name="Frame">
       <a:fillStyleLst>
         <a:solidFill>
           <a:schemeClr val="phClr"/>
         </a:solidFill>
-        <a:gradFill rotWithShape="1">
-          <a:gsLst>
-            <a:gs pos="0">
-              <a:schemeClr val="phClr">
-                <a:lumMod val="110000"/>
-                <a:satMod val="105000"/>
-                <a:tint val="67000"/>
-              </a:schemeClr>
-            </a:gs>
-            <a:gs pos="50000">
-              <a:schemeClr val="phClr">
-                <a:lumMod val="105000"/>
-                <a:satMod val="103000"/>
-                <a:tint val="73000"/>
-              </a:schemeClr>
-            </a:gs>
-            <a:gs pos="100000">
-              <a:schemeClr val="phClr">
-                <a:lumMod val="105000"/>
-                <a:satMod val="109000"/>
-                <a:tint val="81000"/>
-              </a:schemeClr>
-            </a:gs>
-          </a:gsLst>
-          <a:lin ang="5400000" scaled="0"/>
-        </a:gradFill>
-        <a:gradFill rotWithShape="1">
-          <a:gsLst>
-            <a:gs pos="0">
-              <a:schemeClr val="phClr">
-                <a:satMod val="103000"/>
-                <a:lumMod val="102000"/>
-                <a:tint val="94000"/>
-              </a:schemeClr>
-            </a:gs>
-            <a:gs pos="50000">
-              <a:schemeClr val="phClr">
-                <a:satMod val="110000"/>
-                <a:lumMod val="100000"/>
-                <a:shade val="100000"/>
-              </a:schemeClr>
-            </a:gs>
-            <a:gs pos="100000">
-              <a:schemeClr val="phClr">
-                <a:lumMod val="99000"/>
-                <a:satMod val="120000"/>
-                <a:shade val="78000"/>
-              </a:schemeClr>
-            </a:gs>
-          </a:gsLst>
-          <a:lin ang="5400000" scaled="0"/>
-        </a:gradFill>
+        <a:solidFill>
+          <a:schemeClr val="phClr">
+            <a:tint val="65000"/>
+          </a:schemeClr>
+        </a:solidFill>
+        <a:solidFill>
+          <a:schemeClr val="phClr">
+            <a:shade val="80000"/>
+            <a:satMod val="150000"/>
+          </a:schemeClr>
+        </a:solidFill>
       </a:fillStyleLst>
       <a:lnStyleLst>
-        <a:ln w="6350" cap="flat" cmpd="sng" algn="ctr">
+        <a:ln w="9525" cap="flat" cmpd="sng" algn="ctr">
           <a:solidFill>
             <a:schemeClr val="phClr"/>
           </a:solidFill>
           <a:prstDash val="solid"/>
-          <a:miter lim="800000"/>
         </a:ln>
-        <a:ln w="12700" cap="flat" cmpd="sng" algn="ctr">
+        <a:ln w="10795" cap="flat" cmpd="sng" algn="ctr">
           <a:solidFill>
             <a:schemeClr val="phClr"/>
           </a:solidFill>
           <a:prstDash val="solid"/>
-          <a:miter lim="800000"/>
         </a:ln>
-        <a:ln w="19050" cap="flat" cmpd="sng" algn="ctr">
+        <a:ln w="17145" cap="flat" cmpd="sng" algn="ctr">
           <a:solidFill>
-            <a:schemeClr val="phClr"/>
+            <a:schemeClr val="phClr">
+              <a:shade val="95000"/>
+              <a:alpha val="50000"/>
+              <a:satMod val="150000"/>
+            </a:schemeClr>
           </a:solidFill>
           <a:prstDash val="solid"/>
-          <a:miter lim="800000"/>
         </a:ln>
       </a:lnStyleLst>
       <a:effectStyleLst>
@@ -4680,12 +5276,21 @@
         </a:effectStyle>
         <a:effectStyle>
           <a:effectLst>
-            <a:outerShdw blurRad="57150" dist="19050" dir="5400000" algn="ctr" rotWithShape="0">
+            <a:outerShdw blurRad="44450" dist="13970" dir="5400000" algn="ctr" rotWithShape="0">
               <a:srgbClr val="000000">
-                <a:alpha val="63000"/>
+                <a:alpha val="45000"/>
               </a:srgbClr>
             </a:outerShdw>
           </a:effectLst>
+          <a:scene3d>
+            <a:camera prst="orthographicFront">
+              <a:rot lat="0" lon="0" rev="0"/>
+            </a:camera>
+            <a:lightRig rig="twoPt" dir="tl"/>
+          </a:scene3d>
+          <a:sp3d prstMaterial="flat">
+            <a:bevelT w="12700" h="25400" prst="coolSlant"/>
+          </a:sp3d>
         </a:effectStyle>
       </a:effectStyleLst>
       <a:bgFillStyleLst>
@@ -4703,23 +5308,24 @@
             <a:gs pos="0">
               <a:schemeClr val="phClr">
                 <a:tint val="93000"/>
-                <a:satMod val="150000"/>
                 <a:shade val="98000"/>
+                <a:satMod val="120000"/>
                 <a:lumMod val="102000"/>
               </a:schemeClr>
             </a:gs>
-            <a:gs pos="50000">
+            <a:gs pos="48000">
               <a:schemeClr val="phClr">
                 <a:tint val="98000"/>
-                <a:satMod val="130000"/>
                 <a:shade val="90000"/>
+                <a:satMod val="110000"/>
                 <a:lumMod val="103000"/>
               </a:schemeClr>
             </a:gs>
             <a:gs pos="100000">
               <a:schemeClr val="phClr">
-                <a:shade val="63000"/>
-                <a:satMod val="120000"/>
+                <a:tint val="98000"/>
+                <a:shade val="80000"/>
+                <a:satMod val="100000"/>
               </a:schemeClr>
             </a:gs>
           </a:gsLst>
@@ -4732,7 +5338,7 @@
   <a:extraClrSchemeLst/>
   <a:extLst>
     <a:ext uri="{05A4C25C-085E-4340-85A3-A5531E510DB2}">
-      <thm15:themeFamily xmlns:thm15="http://schemas.microsoft.com/office/thememl/2012/main" name="Office Theme" id="{62F939B6-93AF-4DB8-9C6B-D6C7DFDC589F}" vid="{4A3C46E8-61CC-4603-A589-7422A47A8E4A}"/>
+      <thm15:themeFamily xmlns:thm15="http://schemas.microsoft.com/office/thememl/2012/main" name="Frame" id="{F226E7A2-7162-461C-9490-D27D9DC04E43}" vid="{18A1B607-7BAE-46D6-8090-545AC7BDD739}"/>
     </a:ext>
   </a:extLst>
 </a:theme>

</xml_diff>